<commit_message>
Updated Day7 slides to include intro summary
Former-commit-id: 05d85c01a24c0a09b04796d4c9751bce93c81c30
</commit_message>
<xml_diff>
--- a/day07/slides/Day7_slides.pptx
+++ b/day07/slides/Day7_slides.pptx
@@ -22,17 +22,16 @@
     <p:sldId id="267" r:id="rId17"/>
     <p:sldId id="268" r:id="rId18"/>
     <p:sldId id="269" r:id="rId19"/>
-    <p:sldId id="270" r:id="rId20"/>
   </p:sldIdLst>
   <p:sldSz cy="5143500" cx="9144000"/>
   <p:notesSz cx="6858000" cy="9144000"/>
   <p:embeddedFontLst>
     <p:embeddedFont>
       <p:font typeface="Helvetica Neue"/>
-      <p:regular r:id="rId21"/>
-      <p:bold r:id="rId22"/>
-      <p:italic r:id="rId23"/>
-      <p:boldItalic r:id="rId24"/>
+      <p:regular r:id="rId20"/>
+      <p:bold r:id="rId21"/>
+      <p:italic r:id="rId22"/>
+      <p:boldItalic r:id="rId23"/>
     </p:embeddedFont>
   </p:embeddedFontLst>
   <p:defaultTextStyle>
@@ -831,7 +830,7 @@
   <p:cSld>
     <p:spTree>
       <p:nvGrpSpPr>
-        <p:cNvPr id="122" name="Shape 122"/>
+        <p:cNvPr id="123" name="Shape 123"/>
         <p:cNvGrpSpPr/>
         <p:nvPr/>
       </p:nvGrpSpPr>
@@ -845,7 +844,7 @@
       </p:grpSpPr>
       <p:sp>
         <p:nvSpPr>
-          <p:cNvPr id="123" name="Google Shape;123;g258956bab95_0_0:notes"/>
+          <p:cNvPr id="124" name="Google Shape;124;g258956bab95_0_5:notes"/>
           <p:cNvSpPr/>
           <p:nvPr>
             <p:ph idx="2" type="sldImg"/>
@@ -880,7 +879,7 @@
       </p:sp>
       <p:sp>
         <p:nvSpPr>
-          <p:cNvPr id="124" name="Google Shape;124;g258956bab95_0_0:notes"/>
+          <p:cNvPr id="125" name="Google Shape;125;g258956bab95_0_5:notes"/>
           <p:cNvSpPr txBox="1"/>
           <p:nvPr>
             <p:ph idx="1" type="body"/>
@@ -930,7 +929,7 @@
   <p:cSld>
     <p:spTree>
       <p:nvGrpSpPr>
-        <p:cNvPr id="128" name="Shape 128"/>
+        <p:cNvPr id="130" name="Shape 130"/>
         <p:cNvGrpSpPr/>
         <p:nvPr/>
       </p:nvGrpSpPr>
@@ -944,7 +943,7 @@
       </p:grpSpPr>
       <p:sp>
         <p:nvSpPr>
-          <p:cNvPr id="129" name="Google Shape;129;g258956bab95_0_5:notes"/>
+          <p:cNvPr id="131" name="Google Shape;131;g22ea25fd1ab_0_152:notes"/>
           <p:cNvSpPr/>
           <p:nvPr>
             <p:ph idx="2" type="sldImg"/>
@@ -979,7 +978,7 @@
       </p:sp>
       <p:sp>
         <p:nvSpPr>
-          <p:cNvPr id="130" name="Google Shape;130;g258956bab95_0_5:notes"/>
+          <p:cNvPr id="132" name="Google Shape;132;g22ea25fd1ab_0_152:notes"/>
           <p:cNvSpPr txBox="1"/>
           <p:nvPr>
             <p:ph idx="1" type="body"/>
@@ -1029,7 +1028,7 @@
   <p:cSld>
     <p:spTree>
       <p:nvGrpSpPr>
-        <p:cNvPr id="135" name="Shape 135"/>
+        <p:cNvPr id="137" name="Shape 137"/>
         <p:cNvGrpSpPr/>
         <p:nvPr/>
       </p:nvGrpSpPr>
@@ -1043,7 +1042,7 @@
       </p:grpSpPr>
       <p:sp>
         <p:nvSpPr>
-          <p:cNvPr id="136" name="Google Shape;136;g22ea25fd1ab_0_152:notes"/>
+          <p:cNvPr id="138" name="Google Shape;138;g22ea25fd1ab_0_180:notes"/>
           <p:cNvSpPr/>
           <p:nvPr>
             <p:ph idx="2" type="sldImg"/>
@@ -1078,7 +1077,7 @@
       </p:sp>
       <p:sp>
         <p:nvSpPr>
-          <p:cNvPr id="137" name="Google Shape;137;g22ea25fd1ab_0_152:notes"/>
+          <p:cNvPr id="139" name="Google Shape;139;g22ea25fd1ab_0_180:notes"/>
           <p:cNvSpPr txBox="1"/>
           <p:nvPr>
             <p:ph idx="1" type="body"/>
@@ -1128,7 +1127,7 @@
   <p:cSld>
     <p:spTree>
       <p:nvGrpSpPr>
-        <p:cNvPr id="141" name="Shape 141"/>
+        <p:cNvPr id="143" name="Shape 143"/>
         <p:cNvGrpSpPr/>
         <p:nvPr/>
       </p:nvGrpSpPr>
@@ -1142,7 +1141,7 @@
       </p:grpSpPr>
       <p:sp>
         <p:nvSpPr>
-          <p:cNvPr id="142" name="Google Shape;142;g22ea25fd1ab_0_180:notes"/>
+          <p:cNvPr id="144" name="Google Shape;144;g22ea25fd1ab_0_257:notes"/>
           <p:cNvSpPr/>
           <p:nvPr>
             <p:ph idx="2" type="sldImg"/>
@@ -1177,7 +1176,7 @@
       </p:sp>
       <p:sp>
         <p:nvSpPr>
-          <p:cNvPr id="143" name="Google Shape;143;g22ea25fd1ab_0_180:notes"/>
+          <p:cNvPr id="145" name="Google Shape;145;g22ea25fd1ab_0_257:notes"/>
           <p:cNvSpPr txBox="1"/>
           <p:nvPr>
             <p:ph idx="1" type="body"/>
@@ -1227,7 +1226,7 @@
   <p:cSld>
     <p:spTree>
       <p:nvGrpSpPr>
-        <p:cNvPr id="147" name="Shape 147"/>
+        <p:cNvPr id="149" name="Shape 149"/>
         <p:cNvGrpSpPr/>
         <p:nvPr/>
       </p:nvGrpSpPr>
@@ -1241,7 +1240,7 @@
       </p:grpSpPr>
       <p:sp>
         <p:nvSpPr>
-          <p:cNvPr id="148" name="Google Shape;148;g22ea25fd1ab_0_257:notes"/>
+          <p:cNvPr id="150" name="Google Shape;150;g22ea25fd1ab_0_175:notes"/>
           <p:cNvSpPr/>
           <p:nvPr>
             <p:ph idx="2" type="sldImg"/>
@@ -1276,106 +1275,7 @@
       </p:sp>
       <p:sp>
         <p:nvSpPr>
-          <p:cNvPr id="149" name="Google Shape;149;g22ea25fd1ab_0_257:notes"/>
-          <p:cNvSpPr txBox="1"/>
-          <p:nvPr>
-            <p:ph idx="1" type="body"/>
-          </p:nvPr>
-        </p:nvSpPr>
-        <p:spPr>
-          <a:xfrm>
-            <a:off x="685800" y="4343400"/>
-            <a:ext cx="5486400" cy="4114800"/>
-          </a:xfrm>
-          <a:prstGeom prst="rect">
-            <a:avLst/>
-          </a:prstGeom>
-        </p:spPr>
-        <p:txBody>
-          <a:bodyPr anchorCtr="0" anchor="t" bIns="91425" lIns="91425" spcFirstLastPara="1" rIns="91425" wrap="square" tIns="91425">
-            <a:noAutofit/>
-          </a:bodyPr>
-          <a:lstStyle/>
-          <a:p>
-            <a:pPr indent="0" lvl="0" marL="0" rtl="0" algn="l">
-              <a:spcBef>
-                <a:spcPts val="0"/>
-              </a:spcBef>
-              <a:spcAft>
-                <a:spcPts val="0"/>
-              </a:spcAft>
-              <a:buNone/>
-            </a:pPr>
-            <a:r>
-              <a:t/>
-            </a:r>
-            <a:endParaRPr/>
-          </a:p>
-        </p:txBody>
-      </p:sp>
-    </p:spTree>
-  </p:cSld>
-  <p:clrMapOvr>
-    <a:masterClrMapping/>
-  </p:clrMapOvr>
-</p:notes>
-</file>
-
-<file path=ppt/notesSlides/notesSlide15.xml><?xml version="1.0" encoding="utf-8"?>
-<p:notes xmlns:a="http://schemas.openxmlformats.org/drawingml/2006/main" xmlns:r="http://schemas.openxmlformats.org/officeDocument/2006/relationships" xmlns:mc="http://schemas.openxmlformats.org/markup-compatibility/2006" xmlns:mv="urn:schemas-microsoft-com:mac:vml" xmlns:p="http://schemas.openxmlformats.org/presentationml/2006/main" xmlns:c="http://schemas.openxmlformats.org/drawingml/2006/chart" xmlns:dgm="http://schemas.openxmlformats.org/drawingml/2006/diagram" xmlns:o="urn:schemas-microsoft-com:office:office" xmlns:v="urn:schemas-microsoft-com:vml" xmlns:pvml="urn:schemas-microsoft-com:office:powerpoint" xmlns:com="http://schemas.openxmlformats.org/drawingml/2006/compatibility" xmlns:p14="http://schemas.microsoft.com/office/powerpoint/2010/main" xmlns:p15="http://schemas.microsoft.com/office/powerpoint/2012/main" xmlns:ahyp="http://schemas.microsoft.com/office/drawing/2018/hyperlinkcolor" showMasterPhAnim="0" showMasterSp="0">
-  <p:cSld>
-    <p:spTree>
-      <p:nvGrpSpPr>
-        <p:cNvPr id="153" name="Shape 153"/>
-        <p:cNvGrpSpPr/>
-        <p:nvPr/>
-      </p:nvGrpSpPr>
-      <p:grpSpPr>
-        <a:xfrm>
-          <a:off x="0" y="0"/>
-          <a:ext cx="0" cy="0"/>
-          <a:chOff x="0" y="0"/>
-          <a:chExt cx="0" cy="0"/>
-        </a:xfrm>
-      </p:grpSpPr>
-      <p:sp>
-        <p:nvSpPr>
-          <p:cNvPr id="154" name="Google Shape;154;g22ea25fd1ab_0_175:notes"/>
-          <p:cNvSpPr/>
-          <p:nvPr>
-            <p:ph idx="2" type="sldImg"/>
-          </p:nvPr>
-        </p:nvSpPr>
-        <p:spPr>
-          <a:xfrm>
-            <a:off x="381300" y="685800"/>
-            <a:ext cx="6096000" cy="3429000"/>
-          </a:xfrm>
-          <a:custGeom>
-            <a:rect b="b" l="l" r="r" t="t"/>
-            <a:pathLst>
-              <a:path extrusionOk="0" h="120000" w="120000">
-                <a:moveTo>
-                  <a:pt x="0" y="0"/>
-                </a:moveTo>
-                <a:lnTo>
-                  <a:pt x="120000" y="0"/>
-                </a:lnTo>
-                <a:lnTo>
-                  <a:pt x="120000" y="120000"/>
-                </a:lnTo>
-                <a:lnTo>
-                  <a:pt x="0" y="120000"/>
-                </a:lnTo>
-                <a:close/>
-              </a:path>
-            </a:pathLst>
-          </a:custGeom>
-        </p:spPr>
-      </p:sp>
-      <p:sp>
-        <p:nvSpPr>
-          <p:cNvPr id="155" name="Google Shape;155;g22ea25fd1ab_0_175:notes"/>
+          <p:cNvPr id="151" name="Google Shape;151;g22ea25fd1ab_0_175:notes"/>
           <p:cNvSpPr txBox="1"/>
           <p:nvPr>
             <p:ph idx="1" type="body"/>
@@ -1623,7 +1523,7 @@
   <p:cSld>
     <p:spTree>
       <p:nvGrpSpPr>
-        <p:cNvPr id="70" name="Shape 70"/>
+        <p:cNvPr id="75" name="Shape 75"/>
         <p:cNvGrpSpPr/>
         <p:nvPr/>
       </p:nvGrpSpPr>
@@ -1637,106 +1537,7 @@
       </p:grpSpPr>
       <p:sp>
         <p:nvSpPr>
-          <p:cNvPr id="71" name="Google Shape;71;g22ea25fd1ab_0_242:notes"/>
-          <p:cNvSpPr/>
-          <p:nvPr>
-            <p:ph idx="2" type="sldImg"/>
-          </p:nvPr>
-        </p:nvSpPr>
-        <p:spPr>
-          <a:xfrm>
-            <a:off x="381300" y="685800"/>
-            <a:ext cx="6096000" cy="3429000"/>
-          </a:xfrm>
-          <a:custGeom>
-            <a:rect b="b" l="l" r="r" t="t"/>
-            <a:pathLst>
-              <a:path extrusionOk="0" h="120000" w="120000">
-                <a:moveTo>
-                  <a:pt x="0" y="0"/>
-                </a:moveTo>
-                <a:lnTo>
-                  <a:pt x="120000" y="0"/>
-                </a:lnTo>
-                <a:lnTo>
-                  <a:pt x="120000" y="120000"/>
-                </a:lnTo>
-                <a:lnTo>
-                  <a:pt x="0" y="120000"/>
-                </a:lnTo>
-                <a:close/>
-              </a:path>
-            </a:pathLst>
-          </a:custGeom>
-        </p:spPr>
-      </p:sp>
-      <p:sp>
-        <p:nvSpPr>
-          <p:cNvPr id="72" name="Google Shape;72;g22ea25fd1ab_0_242:notes"/>
-          <p:cNvSpPr txBox="1"/>
-          <p:nvPr>
-            <p:ph idx="1" type="body"/>
-          </p:nvPr>
-        </p:nvSpPr>
-        <p:spPr>
-          <a:xfrm>
-            <a:off x="685800" y="4343400"/>
-            <a:ext cx="5486400" cy="4114800"/>
-          </a:xfrm>
-          <a:prstGeom prst="rect">
-            <a:avLst/>
-          </a:prstGeom>
-        </p:spPr>
-        <p:txBody>
-          <a:bodyPr anchorCtr="0" anchor="t" bIns="91425" lIns="91425" spcFirstLastPara="1" rIns="91425" wrap="square" tIns="91425">
-            <a:noAutofit/>
-          </a:bodyPr>
-          <a:lstStyle/>
-          <a:p>
-            <a:pPr indent="0" lvl="0" marL="0" rtl="0" algn="l">
-              <a:spcBef>
-                <a:spcPts val="0"/>
-              </a:spcBef>
-              <a:spcAft>
-                <a:spcPts val="0"/>
-              </a:spcAft>
-              <a:buNone/>
-            </a:pPr>
-            <a:r>
-              <a:t/>
-            </a:r>
-            <a:endParaRPr/>
-          </a:p>
-        </p:txBody>
-      </p:sp>
-    </p:spTree>
-  </p:cSld>
-  <p:clrMapOvr>
-    <a:masterClrMapping/>
-  </p:clrMapOvr>
-</p:notes>
-</file>
-
-<file path=ppt/notesSlides/notesSlide5.xml><?xml version="1.0" encoding="utf-8"?>
-<p:notes xmlns:a="http://schemas.openxmlformats.org/drawingml/2006/main" xmlns:r="http://schemas.openxmlformats.org/officeDocument/2006/relationships" xmlns:mc="http://schemas.openxmlformats.org/markup-compatibility/2006" xmlns:mv="urn:schemas-microsoft-com:mac:vml" xmlns:p="http://schemas.openxmlformats.org/presentationml/2006/main" xmlns:c="http://schemas.openxmlformats.org/drawingml/2006/chart" xmlns:dgm="http://schemas.openxmlformats.org/drawingml/2006/diagram" xmlns:o="urn:schemas-microsoft-com:office:office" xmlns:v="urn:schemas-microsoft-com:vml" xmlns:pvml="urn:schemas-microsoft-com:office:powerpoint" xmlns:com="http://schemas.openxmlformats.org/drawingml/2006/compatibility" xmlns:p14="http://schemas.microsoft.com/office/powerpoint/2010/main" xmlns:p15="http://schemas.microsoft.com/office/powerpoint/2012/main" xmlns:ahyp="http://schemas.microsoft.com/office/drawing/2018/hyperlinkcolor" showMasterPhAnim="0" showMasterSp="0">
-  <p:cSld>
-    <p:spTree>
-      <p:nvGrpSpPr>
-        <p:cNvPr id="80" name="Shape 80"/>
-        <p:cNvGrpSpPr/>
-        <p:nvPr/>
-      </p:nvGrpSpPr>
-      <p:grpSpPr>
-        <a:xfrm>
-          <a:off x="0" y="0"/>
-          <a:ext cx="0" cy="0"/>
-          <a:chOff x="0" y="0"/>
-          <a:chExt cx="0" cy="0"/>
-        </a:xfrm>
-      </p:grpSpPr>
-      <p:sp>
-        <p:nvSpPr>
-          <p:cNvPr id="81" name="Google Shape;81;g22ea25fd1ab_0_5:notes"/>
+          <p:cNvPr id="76" name="Google Shape;76;g22ea25fd1ab_0_5:notes"/>
           <p:cNvSpPr/>
           <p:nvPr>
             <p:ph idx="2" type="sldImg"/>
@@ -1781,7 +1582,7 @@
       </p:sp>
       <p:sp>
         <p:nvSpPr>
-          <p:cNvPr id="82" name="Google Shape;82;g22ea25fd1ab_0_5:notes"/>
+          <p:cNvPr id="77" name="Google Shape;77;g22ea25fd1ab_0_5:notes"/>
           <p:cNvSpPr txBox="1"/>
           <p:nvPr>
             <p:ph idx="1" type="body"/>
@@ -1834,12 +1635,12 @@
 </p:notes>
 </file>
 
-<file path=ppt/notesSlides/notesSlide6.xml><?xml version="1.0" encoding="utf-8"?>
+<file path=ppt/notesSlides/notesSlide5.xml><?xml version="1.0" encoding="utf-8"?>
 <p:notes xmlns:a="http://schemas.openxmlformats.org/drawingml/2006/main" xmlns:r="http://schemas.openxmlformats.org/officeDocument/2006/relationships" xmlns:mc="http://schemas.openxmlformats.org/markup-compatibility/2006" xmlns:mv="urn:schemas-microsoft-com:mac:vml" xmlns:p="http://schemas.openxmlformats.org/presentationml/2006/main" xmlns:c="http://schemas.openxmlformats.org/drawingml/2006/chart" xmlns:dgm="http://schemas.openxmlformats.org/drawingml/2006/diagram" xmlns:o="urn:schemas-microsoft-com:office:office" xmlns:v="urn:schemas-microsoft-com:vml" xmlns:pvml="urn:schemas-microsoft-com:office:powerpoint" xmlns:com="http://schemas.openxmlformats.org/drawingml/2006/compatibility" xmlns:p14="http://schemas.microsoft.com/office/powerpoint/2010/main" xmlns:p15="http://schemas.microsoft.com/office/powerpoint/2012/main" xmlns:ahyp="http://schemas.microsoft.com/office/drawing/2018/hyperlinkcolor" showMasterPhAnim="0" showMasterSp="0">
   <p:cSld>
     <p:spTree>
       <p:nvGrpSpPr>
-        <p:cNvPr id="90" name="Shape 90"/>
+        <p:cNvPr id="85" name="Shape 85"/>
         <p:cNvGrpSpPr/>
         <p:nvPr/>
       </p:nvGrpSpPr>
@@ -1853,7 +1654,7 @@
       </p:grpSpPr>
       <p:sp>
         <p:nvSpPr>
-          <p:cNvPr id="91" name="Google Shape;91;g22ea25fd1ab_0_81:notes"/>
+          <p:cNvPr id="86" name="Google Shape;86;g22ea25fd1ab_0_81:notes"/>
           <p:cNvSpPr/>
           <p:nvPr>
             <p:ph idx="2" type="sldImg"/>
@@ -1898,7 +1699,7 @@
       </p:sp>
       <p:sp>
         <p:nvSpPr>
-          <p:cNvPr id="92" name="Google Shape;92;g22ea25fd1ab_0_81:notes"/>
+          <p:cNvPr id="87" name="Google Shape;87;g22ea25fd1ab_0_81:notes"/>
           <p:cNvSpPr txBox="1"/>
           <p:nvPr>
             <p:ph idx="1" type="body"/>
@@ -1951,12 +1752,12 @@
 </p:notes>
 </file>
 
-<file path=ppt/notesSlides/notesSlide7.xml><?xml version="1.0" encoding="utf-8"?>
+<file path=ppt/notesSlides/notesSlide6.xml><?xml version="1.0" encoding="utf-8"?>
 <p:notes xmlns:a="http://schemas.openxmlformats.org/drawingml/2006/main" xmlns:r="http://schemas.openxmlformats.org/officeDocument/2006/relationships" xmlns:mc="http://schemas.openxmlformats.org/markup-compatibility/2006" xmlns:mv="urn:schemas-microsoft-com:mac:vml" xmlns:p="http://schemas.openxmlformats.org/presentationml/2006/main" xmlns:c="http://schemas.openxmlformats.org/drawingml/2006/chart" xmlns:dgm="http://schemas.openxmlformats.org/drawingml/2006/diagram" xmlns:o="urn:schemas-microsoft-com:office:office" xmlns:v="urn:schemas-microsoft-com:vml" xmlns:pvml="urn:schemas-microsoft-com:office:powerpoint" xmlns:com="http://schemas.openxmlformats.org/drawingml/2006/compatibility" xmlns:p14="http://schemas.microsoft.com/office/powerpoint/2010/main" xmlns:p15="http://schemas.microsoft.com/office/powerpoint/2012/main" xmlns:ahyp="http://schemas.microsoft.com/office/drawing/2018/hyperlinkcolor" showMasterPhAnim="0" showMasterSp="0">
   <p:cSld>
     <p:spTree>
       <p:nvGrpSpPr>
-        <p:cNvPr id="98" name="Shape 98"/>
+        <p:cNvPr id="93" name="Shape 93"/>
         <p:cNvGrpSpPr/>
         <p:nvPr/>
       </p:nvGrpSpPr>
@@ -1970,7 +1771,7 @@
       </p:grpSpPr>
       <p:sp>
         <p:nvSpPr>
-          <p:cNvPr id="99" name="Google Shape;99;g22ea25fd1ab_0_142:notes"/>
+          <p:cNvPr id="94" name="Google Shape;94;g22ea25fd1ab_0_142:notes"/>
           <p:cNvSpPr/>
           <p:nvPr>
             <p:ph idx="2" type="sldImg"/>
@@ -2005,7 +1806,7 @@
       </p:sp>
       <p:sp>
         <p:nvSpPr>
-          <p:cNvPr id="100" name="Google Shape;100;g22ea25fd1ab_0_142:notes"/>
+          <p:cNvPr id="95" name="Google Shape;95;g22ea25fd1ab_0_142:notes"/>
           <p:cNvSpPr txBox="1"/>
           <p:nvPr>
             <p:ph idx="1" type="body"/>
@@ -2050,12 +1851,12 @@
 </p:notes>
 </file>
 
-<file path=ppt/notesSlides/notesSlide8.xml><?xml version="1.0" encoding="utf-8"?>
+<file path=ppt/notesSlides/notesSlide7.xml><?xml version="1.0" encoding="utf-8"?>
 <p:notes xmlns:a="http://schemas.openxmlformats.org/drawingml/2006/main" xmlns:r="http://schemas.openxmlformats.org/officeDocument/2006/relationships" xmlns:mc="http://schemas.openxmlformats.org/markup-compatibility/2006" xmlns:mv="urn:schemas-microsoft-com:mac:vml" xmlns:p="http://schemas.openxmlformats.org/presentationml/2006/main" xmlns:c="http://schemas.openxmlformats.org/drawingml/2006/chart" xmlns:dgm="http://schemas.openxmlformats.org/drawingml/2006/diagram" xmlns:o="urn:schemas-microsoft-com:office:office" xmlns:v="urn:schemas-microsoft-com:vml" xmlns:pvml="urn:schemas-microsoft-com:office:powerpoint" xmlns:com="http://schemas.openxmlformats.org/drawingml/2006/compatibility" xmlns:p14="http://schemas.microsoft.com/office/powerpoint/2010/main" xmlns:p15="http://schemas.microsoft.com/office/powerpoint/2012/main" xmlns:ahyp="http://schemas.microsoft.com/office/drawing/2018/hyperlinkcolor" showMasterPhAnim="0" showMasterSp="0">
   <p:cSld>
     <p:spTree>
       <p:nvGrpSpPr>
-        <p:cNvPr id="107" name="Shape 107"/>
+        <p:cNvPr id="102" name="Shape 102"/>
         <p:cNvGrpSpPr/>
         <p:nvPr/>
       </p:nvGrpSpPr>
@@ -2069,7 +1870,7 @@
       </p:grpSpPr>
       <p:sp>
         <p:nvSpPr>
-          <p:cNvPr id="108" name="Google Shape;108;g22ea25fd1ab_0_163:notes"/>
+          <p:cNvPr id="103" name="Google Shape;103;g22ea25fd1ab_0_163:notes"/>
           <p:cNvSpPr/>
           <p:nvPr>
             <p:ph idx="2" type="sldImg"/>
@@ -2104,7 +1905,7 @@
       </p:sp>
       <p:sp>
         <p:nvSpPr>
-          <p:cNvPr id="109" name="Google Shape;109;g22ea25fd1ab_0_163:notes"/>
+          <p:cNvPr id="104" name="Google Shape;104;g22ea25fd1ab_0_163:notes"/>
           <p:cNvSpPr txBox="1"/>
           <p:nvPr>
             <p:ph idx="1" type="body"/>
@@ -2149,12 +1950,12 @@
 </p:notes>
 </file>
 
-<file path=ppt/notesSlides/notesSlide9.xml><?xml version="1.0" encoding="utf-8"?>
+<file path=ppt/notesSlides/notesSlide8.xml><?xml version="1.0" encoding="utf-8"?>
 <p:notes xmlns:a="http://schemas.openxmlformats.org/drawingml/2006/main" xmlns:r="http://schemas.openxmlformats.org/officeDocument/2006/relationships" xmlns:mc="http://schemas.openxmlformats.org/markup-compatibility/2006" xmlns:mv="urn:schemas-microsoft-com:mac:vml" xmlns:p="http://schemas.openxmlformats.org/presentationml/2006/main" xmlns:c="http://schemas.openxmlformats.org/drawingml/2006/chart" xmlns:dgm="http://schemas.openxmlformats.org/drawingml/2006/diagram" xmlns:o="urn:schemas-microsoft-com:office:office" xmlns:v="urn:schemas-microsoft-com:vml" xmlns:pvml="urn:schemas-microsoft-com:office:powerpoint" xmlns:com="http://schemas.openxmlformats.org/drawingml/2006/compatibility" xmlns:p14="http://schemas.microsoft.com/office/powerpoint/2010/main" xmlns:p15="http://schemas.microsoft.com/office/powerpoint/2012/main" xmlns:ahyp="http://schemas.microsoft.com/office/drawing/2018/hyperlinkcolor" showMasterPhAnim="0" showMasterSp="0">
   <p:cSld>
     <p:spTree>
       <p:nvGrpSpPr>
-        <p:cNvPr id="116" name="Shape 116"/>
+        <p:cNvPr id="111" name="Shape 111"/>
         <p:cNvGrpSpPr/>
         <p:nvPr/>
       </p:nvGrpSpPr>
@@ -2168,7 +1969,7 @@
       </p:grpSpPr>
       <p:sp>
         <p:nvSpPr>
-          <p:cNvPr id="117" name="Google Shape;117;g22ea25fd1ab_0_28:notes"/>
+          <p:cNvPr id="112" name="Google Shape;112;g22ea25fd1ab_0_28:notes"/>
           <p:cNvSpPr/>
           <p:nvPr>
             <p:ph idx="2" type="sldImg"/>
@@ -2213,7 +2014,7 @@
       </p:sp>
       <p:sp>
         <p:nvSpPr>
-          <p:cNvPr id="118" name="Google Shape;118;g22ea25fd1ab_0_28:notes"/>
+          <p:cNvPr id="113" name="Google Shape;113;g22ea25fd1ab_0_28:notes"/>
           <p:cNvSpPr txBox="1"/>
           <p:nvPr>
             <p:ph idx="1" type="body"/>
@@ -2249,6 +2050,105 @@
                 <a:spcPts val="0"/>
               </a:spcAft>
               <a:buSzPts val="1100"/>
+              <a:buNone/>
+            </a:pPr>
+            <a:r>
+              <a:t/>
+            </a:r>
+            <a:endParaRPr/>
+          </a:p>
+        </p:txBody>
+      </p:sp>
+    </p:spTree>
+  </p:cSld>
+  <p:clrMapOvr>
+    <a:masterClrMapping/>
+  </p:clrMapOvr>
+</p:notes>
+</file>
+
+<file path=ppt/notesSlides/notesSlide9.xml><?xml version="1.0" encoding="utf-8"?>
+<p:notes xmlns:a="http://schemas.openxmlformats.org/drawingml/2006/main" xmlns:r="http://schemas.openxmlformats.org/officeDocument/2006/relationships" xmlns:mc="http://schemas.openxmlformats.org/markup-compatibility/2006" xmlns:mv="urn:schemas-microsoft-com:mac:vml" xmlns:p="http://schemas.openxmlformats.org/presentationml/2006/main" xmlns:c="http://schemas.openxmlformats.org/drawingml/2006/chart" xmlns:dgm="http://schemas.openxmlformats.org/drawingml/2006/diagram" xmlns:o="urn:schemas-microsoft-com:office:office" xmlns:v="urn:schemas-microsoft-com:vml" xmlns:pvml="urn:schemas-microsoft-com:office:powerpoint" xmlns:com="http://schemas.openxmlformats.org/drawingml/2006/compatibility" xmlns:p14="http://schemas.microsoft.com/office/powerpoint/2010/main" xmlns:p15="http://schemas.microsoft.com/office/powerpoint/2012/main" xmlns:ahyp="http://schemas.microsoft.com/office/drawing/2018/hyperlinkcolor" showMasterPhAnim="0" showMasterSp="0">
+  <p:cSld>
+    <p:spTree>
+      <p:nvGrpSpPr>
+        <p:cNvPr id="117" name="Shape 117"/>
+        <p:cNvGrpSpPr/>
+        <p:nvPr/>
+      </p:nvGrpSpPr>
+      <p:grpSpPr>
+        <a:xfrm>
+          <a:off x="0" y="0"/>
+          <a:ext cx="0" cy="0"/>
+          <a:chOff x="0" y="0"/>
+          <a:chExt cx="0" cy="0"/>
+        </a:xfrm>
+      </p:grpSpPr>
+      <p:sp>
+        <p:nvSpPr>
+          <p:cNvPr id="118" name="Google Shape;118;g258956bab95_0_0:notes"/>
+          <p:cNvSpPr/>
+          <p:nvPr>
+            <p:ph idx="2" type="sldImg"/>
+          </p:nvPr>
+        </p:nvSpPr>
+        <p:spPr>
+          <a:xfrm>
+            <a:off x="381300" y="685800"/>
+            <a:ext cx="6096000" cy="3429000"/>
+          </a:xfrm>
+          <a:custGeom>
+            <a:rect b="b" l="l" r="r" t="t"/>
+            <a:pathLst>
+              <a:path extrusionOk="0" h="120000" w="120000">
+                <a:moveTo>
+                  <a:pt x="0" y="0"/>
+                </a:moveTo>
+                <a:lnTo>
+                  <a:pt x="120000" y="0"/>
+                </a:lnTo>
+                <a:lnTo>
+                  <a:pt x="120000" y="120000"/>
+                </a:lnTo>
+                <a:lnTo>
+                  <a:pt x="0" y="120000"/>
+                </a:lnTo>
+                <a:close/>
+              </a:path>
+            </a:pathLst>
+          </a:custGeom>
+        </p:spPr>
+      </p:sp>
+      <p:sp>
+        <p:nvSpPr>
+          <p:cNvPr id="119" name="Google Shape;119;g258956bab95_0_0:notes"/>
+          <p:cNvSpPr txBox="1"/>
+          <p:nvPr>
+            <p:ph idx="1" type="body"/>
+          </p:nvPr>
+        </p:nvSpPr>
+        <p:spPr>
+          <a:xfrm>
+            <a:off x="685800" y="4343400"/>
+            <a:ext cx="5486400" cy="4114800"/>
+          </a:xfrm>
+          <a:prstGeom prst="rect">
+            <a:avLst/>
+          </a:prstGeom>
+        </p:spPr>
+        <p:txBody>
+          <a:bodyPr anchorCtr="0" anchor="t" bIns="91425" lIns="91425" spcFirstLastPara="1" rIns="91425" wrap="square" tIns="91425">
+            <a:noAutofit/>
+          </a:bodyPr>
+          <a:lstStyle/>
+          <a:p>
+            <a:pPr indent="0" lvl="0" marL="0" rtl="0" algn="l">
+              <a:spcBef>
+                <a:spcPts val="0"/>
+              </a:spcBef>
+              <a:spcAft>
+                <a:spcPts val="0"/>
+              </a:spcAft>
               <a:buNone/>
             </a:pPr>
             <a:r>
@@ -7081,7 +6981,7 @@
   <p:cSld>
     <p:spTree>
       <p:nvGrpSpPr>
-        <p:cNvPr id="125" name="Shape 125"/>
+        <p:cNvPr id="126" name="Shape 126"/>
         <p:cNvGrpSpPr/>
         <p:nvPr/>
       </p:nvGrpSpPr>
@@ -7095,7 +6995,7 @@
       </p:grpSpPr>
       <p:sp>
         <p:nvSpPr>
-          <p:cNvPr id="126" name="Google Shape;126;p22"/>
+          <p:cNvPr id="127" name="Google Shape;127;p22"/>
           <p:cNvSpPr txBox="1"/>
           <p:nvPr>
             <p:ph type="title"/>
@@ -7135,7 +7035,7 @@
       </p:sp>
       <p:sp>
         <p:nvSpPr>
-          <p:cNvPr id="127" name="Google Shape;127;p22"/>
+          <p:cNvPr id="128" name="Google Shape;128;p22"/>
           <p:cNvSpPr txBox="1"/>
           <p:nvPr>
             <p:ph idx="1" type="body"/>
@@ -7228,172 +7128,6 @@
             </a:pPr>
             <a:r>
               <a:rPr lang="en" sz="2000"/>
-              <a:t>Transcripts</a:t>
-            </a:r>
-            <a:endParaRPr sz="2000"/>
-          </a:p>
-        </p:txBody>
-      </p:sp>
-    </p:spTree>
-  </p:cSld>
-  <p:clrMapOvr>
-    <a:masterClrMapping/>
-  </p:clrMapOvr>
-</p:sld>
-</file>
-
-<file path=ppt/slides/slide11.xml><?xml version="1.0" encoding="utf-8"?>
-<p:sld xmlns:a="http://schemas.openxmlformats.org/drawingml/2006/main" xmlns:r="http://schemas.openxmlformats.org/officeDocument/2006/relationships" xmlns:mc="http://schemas.openxmlformats.org/markup-compatibility/2006" xmlns:mv="urn:schemas-microsoft-com:mac:vml" xmlns:p="http://schemas.openxmlformats.org/presentationml/2006/main" xmlns:c="http://schemas.openxmlformats.org/drawingml/2006/chart" xmlns:dgm="http://schemas.openxmlformats.org/drawingml/2006/diagram" xmlns:o="urn:schemas-microsoft-com:office:office" xmlns:v="urn:schemas-microsoft-com:vml" xmlns:pvml="urn:schemas-microsoft-com:office:powerpoint" xmlns:com="http://schemas.openxmlformats.org/drawingml/2006/compatibility" xmlns:p14="http://schemas.microsoft.com/office/powerpoint/2010/main" xmlns:p15="http://schemas.microsoft.com/office/powerpoint/2012/main" xmlns:ahyp="http://schemas.microsoft.com/office/drawing/2018/hyperlinkcolor">
-  <p:cSld>
-    <p:spTree>
-      <p:nvGrpSpPr>
-        <p:cNvPr id="131" name="Shape 131"/>
-        <p:cNvGrpSpPr/>
-        <p:nvPr/>
-      </p:nvGrpSpPr>
-      <p:grpSpPr>
-        <a:xfrm>
-          <a:off x="0" y="0"/>
-          <a:ext cx="0" cy="0"/>
-          <a:chOff x="0" y="0"/>
-          <a:chExt cx="0" cy="0"/>
-        </a:xfrm>
-      </p:grpSpPr>
-      <p:sp>
-        <p:nvSpPr>
-          <p:cNvPr id="132" name="Google Shape;132;p23"/>
-          <p:cNvSpPr txBox="1"/>
-          <p:nvPr>
-            <p:ph type="title"/>
-          </p:nvPr>
-        </p:nvSpPr>
-        <p:spPr>
-          <a:xfrm>
-            <a:off x="311700" y="445025"/>
-            <a:ext cx="8520600" cy="572700"/>
-          </a:xfrm>
-          <a:prstGeom prst="rect">
-            <a:avLst/>
-          </a:prstGeom>
-        </p:spPr>
-        <p:txBody>
-          <a:bodyPr anchorCtr="0" anchor="t" bIns="91425" lIns="91425" spcFirstLastPara="1" rIns="91425" wrap="square" tIns="91425">
-            <a:normAutofit fontScale="90000"/>
-          </a:bodyPr>
-          <a:lstStyle/>
-          <a:p>
-            <a:pPr indent="0" lvl="0" marL="0" rtl="0" algn="ctr">
-              <a:spcBef>
-                <a:spcPts val="0"/>
-              </a:spcBef>
-              <a:spcAft>
-                <a:spcPts val="0"/>
-              </a:spcAft>
-              <a:buNone/>
-            </a:pPr>
-            <a:r>
-              <a:rPr lang="en"/>
-              <a:t>Challenge Question</a:t>
-            </a:r>
-            <a:endParaRPr/>
-          </a:p>
-        </p:txBody>
-      </p:sp>
-      <p:sp>
-        <p:nvSpPr>
-          <p:cNvPr id="133" name="Google Shape;133;p23"/>
-          <p:cNvSpPr txBox="1"/>
-          <p:nvPr>
-            <p:ph idx="1" type="body"/>
-          </p:nvPr>
-        </p:nvSpPr>
-        <p:spPr>
-          <a:xfrm>
-            <a:off x="311700" y="1152475"/>
-            <a:ext cx="8520600" cy="3416400"/>
-          </a:xfrm>
-          <a:prstGeom prst="rect">
-            <a:avLst/>
-          </a:prstGeom>
-        </p:spPr>
-        <p:txBody>
-          <a:bodyPr anchorCtr="0" anchor="t" bIns="91425" lIns="91425" spcFirstLastPara="1" rIns="91425" wrap="square" tIns="91425">
-            <a:normAutofit/>
-          </a:bodyPr>
-          <a:lstStyle/>
-          <a:p>
-            <a:pPr indent="-355600" lvl="0" marL="457200" rtl="0" algn="l">
-              <a:spcBef>
-                <a:spcPts val="0"/>
-              </a:spcBef>
-              <a:spcAft>
-                <a:spcPts val="0"/>
-              </a:spcAft>
-              <a:buSzPts val="2000"/>
-              <a:buChar char="●"/>
-            </a:pPr>
-            <a:r>
-              <a:rPr lang="en" sz="2000"/>
-              <a:t>What feature would you used to count reads for RNA-seq?</a:t>
-            </a:r>
-            <a:endParaRPr sz="2000"/>
-          </a:p>
-          <a:p>
-            <a:pPr indent="-355600" lvl="0" marL="457200" rtl="0" algn="l">
-              <a:lnSpc>
-                <a:spcPct val="150000"/>
-              </a:lnSpc>
-              <a:spcBef>
-                <a:spcPts val="0"/>
-              </a:spcBef>
-              <a:spcAft>
-                <a:spcPts val="0"/>
-              </a:spcAft>
-              <a:buSzPts val="2000"/>
-              <a:buAutoNum type="alphaUcPeriod"/>
-            </a:pPr>
-            <a:r>
-              <a:rPr lang="en" sz="2000"/>
-              <a:t>Gene</a:t>
-            </a:r>
-            <a:endParaRPr sz="2000"/>
-          </a:p>
-          <a:p>
-            <a:pPr indent="-355600" lvl="0" marL="457200" rtl="0" algn="l">
-              <a:lnSpc>
-                <a:spcPct val="150000"/>
-              </a:lnSpc>
-              <a:spcBef>
-                <a:spcPts val="0"/>
-              </a:spcBef>
-              <a:spcAft>
-                <a:spcPts val="0"/>
-              </a:spcAft>
-              <a:buSzPts val="2000"/>
-              <a:buAutoNum type="alphaUcPeriod"/>
-            </a:pPr>
-            <a:r>
-              <a:rPr lang="en" sz="2000"/>
-              <a:t>Exon</a:t>
-            </a:r>
-            <a:endParaRPr sz="2000"/>
-          </a:p>
-          <a:p>
-            <a:pPr indent="-355600" lvl="0" marL="457200" rtl="0" algn="l">
-              <a:lnSpc>
-                <a:spcPct val="150000"/>
-              </a:lnSpc>
-              <a:spcBef>
-                <a:spcPts val="0"/>
-              </a:spcBef>
-              <a:spcAft>
-                <a:spcPts val="0"/>
-              </a:spcAft>
-              <a:buSzPts val="2000"/>
-              <a:buAutoNum type="alphaUcPeriod"/>
-            </a:pPr>
-            <a:r>
-              <a:rPr lang="en" sz="2000"/>
               <a:t>Transcript</a:t>
             </a:r>
             <a:endParaRPr sz="2000"/>
@@ -7402,7 +7136,7 @@
       </p:sp>
       <p:sp>
         <p:nvSpPr>
-          <p:cNvPr id="134" name="Google Shape;134;p23"/>
+          <p:cNvPr id="129" name="Google Shape;129;p22"/>
           <p:cNvSpPr txBox="1"/>
           <p:nvPr/>
         </p:nvSpPr>
@@ -7458,12 +7192,12 @@
 </p:sld>
 </file>
 
-<file path=ppt/slides/slide12.xml><?xml version="1.0" encoding="utf-8"?>
+<file path=ppt/slides/slide11.xml><?xml version="1.0" encoding="utf-8"?>
 <p:sld xmlns:a="http://schemas.openxmlformats.org/drawingml/2006/main" xmlns:r="http://schemas.openxmlformats.org/officeDocument/2006/relationships" xmlns:mc="http://schemas.openxmlformats.org/markup-compatibility/2006" xmlns:mv="urn:schemas-microsoft-com:mac:vml" xmlns:p="http://schemas.openxmlformats.org/presentationml/2006/main" xmlns:c="http://schemas.openxmlformats.org/drawingml/2006/chart" xmlns:dgm="http://schemas.openxmlformats.org/drawingml/2006/diagram" xmlns:o="urn:schemas-microsoft-com:office:office" xmlns:v="urn:schemas-microsoft-com:vml" xmlns:pvml="urn:schemas-microsoft-com:office:powerpoint" xmlns:com="http://schemas.openxmlformats.org/drawingml/2006/compatibility" xmlns:p14="http://schemas.microsoft.com/office/powerpoint/2010/main" xmlns:p15="http://schemas.microsoft.com/office/powerpoint/2012/main" xmlns:ahyp="http://schemas.microsoft.com/office/drawing/2018/hyperlinkcolor">
   <p:cSld>
     <p:spTree>
       <p:nvGrpSpPr>
-        <p:cNvPr id="138" name="Shape 138"/>
+        <p:cNvPr id="133" name="Shape 133"/>
         <p:cNvGrpSpPr/>
         <p:nvPr/>
       </p:nvGrpSpPr>
@@ -7477,7 +7211,7 @@
       </p:grpSpPr>
       <p:sp>
         <p:nvSpPr>
-          <p:cNvPr id="139" name="Google Shape;139;p24"/>
+          <p:cNvPr id="134" name="Google Shape;134;p23"/>
           <p:cNvSpPr txBox="1"/>
           <p:nvPr>
             <p:ph idx="1" type="body"/>
@@ -7530,7 +7264,7 @@
             <a:endParaRPr sz="2000"/>
           </a:p>
           <a:p>
-            <a:pPr indent="-355600" lvl="1" marL="914400" rtl="0" algn="l">
+            <a:pPr indent="-342900" lvl="1" marL="914400" rtl="0" algn="l">
               <a:lnSpc>
                 <a:spcPct val="150000"/>
               </a:lnSpc>
@@ -7540,20 +7274,20 @@
               <a:spcAft>
                 <a:spcPts val="0"/>
               </a:spcAft>
-              <a:buSzPts val="2000"/>
+              <a:buSzPts val="1800"/>
               <a:buChar char="○"/>
             </a:pPr>
             <a:r>
-              <a:rPr lang="en" sz="2000"/>
-              <a:t>This will be run in RStudio</a:t>
-            </a:r>
-            <a:endParaRPr sz="2000"/>
+              <a:rPr lang="en" sz="1800"/>
+              <a:t>This will be run in an R console in RStudio</a:t>
+            </a:r>
+            <a:endParaRPr sz="1800"/>
           </a:p>
         </p:txBody>
       </p:sp>
       <p:sp>
         <p:nvSpPr>
-          <p:cNvPr id="140" name="Google Shape;140;p24"/>
+          <p:cNvPr id="135" name="Google Shape;135;p23"/>
           <p:cNvSpPr txBox="1"/>
           <p:nvPr>
             <p:ph type="title"/>
@@ -7591,6 +7325,34 @@
           </a:p>
         </p:txBody>
       </p:sp>
+      <p:pic>
+        <p:nvPicPr>
+          <p:cNvPr id="136" name="Google Shape;136;p23"/>
+          <p:cNvPicPr preferRelativeResize="0"/>
+          <p:nvPr/>
+        </p:nvPicPr>
+        <p:blipFill>
+          <a:blip r:embed="rId3">
+            <a:alphaModFix/>
+          </a:blip>
+          <a:stretch>
+            <a:fillRect/>
+          </a:stretch>
+        </p:blipFill>
+        <p:spPr>
+          <a:xfrm>
+            <a:off x="2438962" y="2012200"/>
+            <a:ext cx="4266077" cy="3086101"/>
+          </a:xfrm>
+          <a:prstGeom prst="rect">
+            <a:avLst/>
+          </a:prstGeom>
+          <a:noFill/>
+          <a:ln>
+            <a:noFill/>
+          </a:ln>
+        </p:spPr>
+      </p:pic>
     </p:spTree>
   </p:cSld>
   <p:clrMapOvr>
@@ -7599,12 +7361,12 @@
 </p:sld>
 </file>
 
-<file path=ppt/slides/slide13.xml><?xml version="1.0" encoding="utf-8"?>
+<file path=ppt/slides/slide12.xml><?xml version="1.0" encoding="utf-8"?>
 <p:sld xmlns:a="http://schemas.openxmlformats.org/drawingml/2006/main" xmlns:r="http://schemas.openxmlformats.org/officeDocument/2006/relationships" xmlns:mc="http://schemas.openxmlformats.org/markup-compatibility/2006" xmlns:mv="urn:schemas-microsoft-com:mac:vml" xmlns:p="http://schemas.openxmlformats.org/presentationml/2006/main" xmlns:c="http://schemas.openxmlformats.org/drawingml/2006/chart" xmlns:dgm="http://schemas.openxmlformats.org/drawingml/2006/diagram" xmlns:o="urn:schemas-microsoft-com:office:office" xmlns:v="urn:schemas-microsoft-com:vml" xmlns:pvml="urn:schemas-microsoft-com:office:powerpoint" xmlns:com="http://schemas.openxmlformats.org/drawingml/2006/compatibility" xmlns:p14="http://schemas.microsoft.com/office/powerpoint/2010/main" xmlns:p15="http://schemas.microsoft.com/office/powerpoint/2012/main" xmlns:ahyp="http://schemas.microsoft.com/office/drawing/2018/hyperlinkcolor">
   <p:cSld>
     <p:spTree>
       <p:nvGrpSpPr>
-        <p:cNvPr id="144" name="Shape 144"/>
+        <p:cNvPr id="140" name="Shape 140"/>
         <p:cNvGrpSpPr/>
         <p:nvPr/>
       </p:nvGrpSpPr>
@@ -7618,7 +7380,7 @@
       </p:grpSpPr>
       <p:sp>
         <p:nvSpPr>
-          <p:cNvPr id="145" name="Google Shape;145;p25"/>
+          <p:cNvPr id="141" name="Google Shape;141;p24"/>
           <p:cNvSpPr txBox="1"/>
           <p:nvPr>
             <p:ph type="title"/>
@@ -7658,7 +7420,7 @@
       </p:sp>
       <p:sp>
         <p:nvSpPr>
-          <p:cNvPr id="146" name="Google Shape;146;p25"/>
+          <p:cNvPr id="142" name="Google Shape;142;p24"/>
           <p:cNvSpPr txBox="1"/>
           <p:nvPr>
             <p:ph idx="1" type="body"/>
@@ -7705,12 +7467,12 @@
 </p:sld>
 </file>
 
-<file path=ppt/slides/slide14.xml><?xml version="1.0" encoding="utf-8"?>
+<file path=ppt/slides/slide13.xml><?xml version="1.0" encoding="utf-8"?>
 <p:sld xmlns:a="http://schemas.openxmlformats.org/drawingml/2006/main" xmlns:r="http://schemas.openxmlformats.org/officeDocument/2006/relationships" xmlns:mc="http://schemas.openxmlformats.org/markup-compatibility/2006" xmlns:mv="urn:schemas-microsoft-com:mac:vml" xmlns:p="http://schemas.openxmlformats.org/presentationml/2006/main" xmlns:c="http://schemas.openxmlformats.org/drawingml/2006/chart" xmlns:dgm="http://schemas.openxmlformats.org/drawingml/2006/diagram" xmlns:o="urn:schemas-microsoft-com:office:office" xmlns:v="urn:schemas-microsoft-com:vml" xmlns:pvml="urn:schemas-microsoft-com:office:powerpoint" xmlns:com="http://schemas.openxmlformats.org/drawingml/2006/compatibility" xmlns:p14="http://schemas.microsoft.com/office/powerpoint/2010/main" xmlns:p15="http://schemas.microsoft.com/office/powerpoint/2012/main" xmlns:ahyp="http://schemas.microsoft.com/office/drawing/2018/hyperlinkcolor">
   <p:cSld>
     <p:spTree>
       <p:nvGrpSpPr>
-        <p:cNvPr id="150" name="Shape 150"/>
+        <p:cNvPr id="146" name="Shape 146"/>
         <p:cNvGrpSpPr/>
         <p:nvPr/>
       </p:nvGrpSpPr>
@@ -7724,7 +7486,7 @@
       </p:grpSpPr>
       <p:sp>
         <p:nvSpPr>
-          <p:cNvPr id="151" name="Google Shape;151;p26"/>
+          <p:cNvPr id="147" name="Google Shape;147;p25"/>
           <p:cNvSpPr txBox="1"/>
           <p:nvPr>
             <p:ph type="title"/>
@@ -7764,7 +7526,7 @@
       </p:sp>
       <p:sp>
         <p:nvSpPr>
-          <p:cNvPr id="152" name="Google Shape;152;p26"/>
+          <p:cNvPr id="148" name="Google Shape;148;p25"/>
           <p:cNvSpPr txBox="1"/>
           <p:nvPr>
             <p:ph idx="1" type="body"/>
@@ -7805,7 +7567,7 @@
             <a:endParaRPr sz="2000"/>
           </a:p>
           <a:p>
-            <a:pPr indent="-355600" lvl="1" marL="914400" rtl="0" algn="l">
+            <a:pPr indent="-342900" lvl="1" marL="914400" rtl="0" algn="l">
               <a:lnSpc>
                 <a:spcPct val="150000"/>
               </a:lnSpc>
@@ -7815,17 +7577,17 @@
               <a:spcAft>
                 <a:spcPts val="0"/>
               </a:spcAft>
-              <a:buSzPts val="2000"/>
+              <a:buSzPts val="1800"/>
               <a:buChar char="○"/>
             </a:pPr>
             <a:r>
-              <a:rPr lang="en" sz="2000"/>
+              <a:rPr lang="en" sz="1800"/>
               <a:t>Install DESeq2 in your R packages directory</a:t>
             </a:r>
-            <a:endParaRPr sz="2000"/>
+            <a:endParaRPr sz="1800"/>
           </a:p>
           <a:p>
-            <a:pPr indent="-355600" lvl="1" marL="914400" rtl="0" algn="l">
+            <a:pPr indent="-342900" lvl="1" marL="914400" rtl="0" algn="l">
               <a:lnSpc>
                 <a:spcPct val="150000"/>
               </a:lnSpc>
@@ -7835,17 +7597,17 @@
               <a:spcAft>
                 <a:spcPts val="0"/>
               </a:spcAft>
-              <a:buSzPts val="2000"/>
+              <a:buSzPts val="1800"/>
               <a:buChar char="○"/>
             </a:pPr>
             <a:r>
-              <a:rPr lang="en" sz="2000"/>
+              <a:rPr lang="en" sz="1800"/>
               <a:t>Make a conditions table that matches your count table</a:t>
             </a:r>
-            <a:endParaRPr sz="2000"/>
+            <a:endParaRPr sz="1800"/>
           </a:p>
           <a:p>
-            <a:pPr indent="-355600" lvl="1" marL="914400" rtl="0" algn="l">
+            <a:pPr indent="-342900" lvl="1" marL="914400" rtl="0" algn="l">
               <a:lnSpc>
                 <a:spcPct val="150000"/>
               </a:lnSpc>
@@ -7855,14 +7617,14 @@
               <a:spcAft>
                 <a:spcPts val="0"/>
               </a:spcAft>
-              <a:buSzPts val="2000"/>
+              <a:buSzPts val="1800"/>
               <a:buChar char="○"/>
             </a:pPr>
             <a:r>
-              <a:rPr lang="en" sz="2000"/>
+              <a:rPr lang="en" sz="1800"/>
               <a:t>Run the R script through an sbatch script</a:t>
             </a:r>
-            <a:endParaRPr sz="2000"/>
+            <a:endParaRPr sz="1800"/>
           </a:p>
         </p:txBody>
       </p:sp>
@@ -7874,12 +7636,12 @@
 </p:sld>
 </file>
 
-<file path=ppt/slides/slide15.xml><?xml version="1.0" encoding="utf-8"?>
+<file path=ppt/slides/slide14.xml><?xml version="1.0" encoding="utf-8"?>
 <p:sld xmlns:a="http://schemas.openxmlformats.org/drawingml/2006/main" xmlns:r="http://schemas.openxmlformats.org/officeDocument/2006/relationships" xmlns:mc="http://schemas.openxmlformats.org/markup-compatibility/2006" xmlns:mv="urn:schemas-microsoft-com:mac:vml" xmlns:p="http://schemas.openxmlformats.org/presentationml/2006/main" xmlns:c="http://schemas.openxmlformats.org/drawingml/2006/chart" xmlns:dgm="http://schemas.openxmlformats.org/drawingml/2006/diagram" xmlns:o="urn:schemas-microsoft-com:office:office" xmlns:v="urn:schemas-microsoft-com:vml" xmlns:pvml="urn:schemas-microsoft-com:office:powerpoint" xmlns:com="http://schemas.openxmlformats.org/drawingml/2006/compatibility" xmlns:p14="http://schemas.microsoft.com/office/powerpoint/2010/main" xmlns:p15="http://schemas.microsoft.com/office/powerpoint/2012/main" xmlns:ahyp="http://schemas.microsoft.com/office/drawing/2018/hyperlinkcolor">
   <p:cSld>
     <p:spTree>
       <p:nvGrpSpPr>
-        <p:cNvPr id="156" name="Shape 156"/>
+        <p:cNvPr id="152" name="Shape 152"/>
         <p:cNvGrpSpPr/>
         <p:nvPr/>
       </p:nvGrpSpPr>
@@ -7893,7 +7655,7 @@
       </p:grpSpPr>
       <p:sp>
         <p:nvSpPr>
-          <p:cNvPr id="157" name="Google Shape;157;p27"/>
+          <p:cNvPr id="153" name="Google Shape;153;p26"/>
           <p:cNvSpPr txBox="1"/>
           <p:nvPr>
             <p:ph type="title"/>
@@ -7952,7 +7714,7 @@
       </p:sp>
       <p:sp>
         <p:nvSpPr>
-          <p:cNvPr id="158" name="Google Shape;158;p27"/>
+          <p:cNvPr id="154" name="Google Shape;154;p26"/>
           <p:cNvSpPr txBox="1"/>
           <p:nvPr>
             <p:ph idx="1" type="body"/>
@@ -8016,7 +7778,7 @@
       </p:sp>
       <p:sp>
         <p:nvSpPr>
-          <p:cNvPr id="159" name="Google Shape;159;p27"/>
+          <p:cNvPr id="155" name="Google Shape;155;p26"/>
           <p:cNvSpPr txBox="1"/>
           <p:nvPr>
             <p:ph type="title"/>
@@ -8270,7 +8032,7 @@
         </p:blipFill>
         <p:spPr>
           <a:xfrm>
-            <a:off x="2766591" y="1532674"/>
+            <a:off x="5077141" y="1500724"/>
             <a:ext cx="3610815" cy="3610815"/>
           </a:xfrm>
           <a:prstGeom prst="rect">
@@ -8360,7 +8122,7 @@
         </p:nvSpPr>
         <p:spPr>
           <a:xfrm>
-            <a:off x="987750" y="1415075"/>
+            <a:off x="927475" y="1017725"/>
             <a:ext cx="7168500" cy="483000"/>
           </a:xfrm>
           <a:prstGeom prst="rect">
@@ -8434,84 +8196,15 @@
           </a:p>
         </p:txBody>
       </p:sp>
-    </p:spTree>
-  </p:cSld>
-  <p:clrMapOvr>
-    <a:masterClrMapping/>
-  </p:clrMapOvr>
-</p:sld>
-</file>
-
-<file path=ppt/slides/slide4.xml><?xml version="1.0" encoding="utf-8"?>
-<p:sld xmlns:a="http://schemas.openxmlformats.org/drawingml/2006/main" xmlns:r="http://schemas.openxmlformats.org/officeDocument/2006/relationships" xmlns:mc="http://schemas.openxmlformats.org/markup-compatibility/2006" xmlns:mv="urn:schemas-microsoft-com:mac:vml" xmlns:p="http://schemas.openxmlformats.org/presentationml/2006/main" xmlns:c="http://schemas.openxmlformats.org/drawingml/2006/chart" xmlns:dgm="http://schemas.openxmlformats.org/drawingml/2006/diagram" xmlns:o="urn:schemas-microsoft-com:office:office" xmlns:v="urn:schemas-microsoft-com:vml" xmlns:pvml="urn:schemas-microsoft-com:office:powerpoint" xmlns:com="http://schemas.openxmlformats.org/drawingml/2006/compatibility" xmlns:p14="http://schemas.microsoft.com/office/powerpoint/2010/main" xmlns:p15="http://schemas.microsoft.com/office/powerpoint/2012/main" xmlns:ahyp="http://schemas.microsoft.com/office/drawing/2018/hyperlinkcolor">
-  <p:cSld>
-    <p:spTree>
-      <p:nvGrpSpPr>
-        <p:cNvPr id="73" name="Shape 73"/>
-        <p:cNvGrpSpPr/>
-        <p:nvPr/>
-      </p:nvGrpSpPr>
-      <p:grpSpPr>
-        <a:xfrm>
-          <a:off x="0" y="0"/>
-          <a:ext cx="0" cy="0"/>
-          <a:chOff x="0" y="0"/>
-          <a:chExt cx="0" cy="0"/>
-        </a:xfrm>
-      </p:grpSpPr>
       <p:sp>
         <p:nvSpPr>
-          <p:cNvPr id="74" name="Google Shape;74;p16"/>
-          <p:cNvSpPr txBox="1"/>
-          <p:nvPr>
-            <p:ph type="title"/>
-          </p:nvPr>
-        </p:nvSpPr>
-        <p:spPr>
-          <a:xfrm>
-            <a:off x="311700" y="267075"/>
-            <a:ext cx="8520600" cy="572700"/>
-          </a:xfrm>
-          <a:prstGeom prst="rect">
-            <a:avLst/>
-          </a:prstGeom>
-        </p:spPr>
-        <p:txBody>
-          <a:bodyPr anchorCtr="0" anchor="t" bIns="91425" lIns="91425" spcFirstLastPara="1" rIns="91425" wrap="square" tIns="91425">
-            <a:normAutofit fontScale="90000"/>
-          </a:bodyPr>
-          <a:lstStyle/>
-          <a:p>
-            <a:pPr indent="0" lvl="0" marL="0" rtl="0" algn="ctr">
-              <a:spcBef>
-                <a:spcPts val="0"/>
-              </a:spcBef>
-              <a:spcAft>
-                <a:spcPts val="0"/>
-              </a:spcAft>
-              <a:buNone/>
-            </a:pPr>
-            <a:r>
-              <a:rPr lang="en"/>
-              <a:t>Differential</a:t>
-            </a:r>
-            <a:r>
-              <a:rPr lang="en"/>
-              <a:t> gene expression pipeline</a:t>
-            </a:r>
-            <a:endParaRPr/>
-          </a:p>
-        </p:txBody>
-      </p:sp>
-      <p:sp>
-        <p:nvSpPr>
-          <p:cNvPr id="75" name="Google Shape;75;p16"/>
+          <p:cNvPr id="70" name="Google Shape;70;p15"/>
           <p:cNvSpPr/>
           <p:nvPr/>
         </p:nvSpPr>
         <p:spPr>
           <a:xfrm>
-            <a:off x="2856150" y="1279550"/>
+            <a:off x="625950" y="1717525"/>
             <a:ext cx="3431700" cy="635400"/>
           </a:xfrm>
           <a:prstGeom prst="roundRect">
@@ -8524,7 +8217,7 @@
           </a:solidFill>
           <a:ln cap="flat" cmpd="sng" w="9525">
             <a:solidFill>
-              <a:schemeClr val="dk2"/>
+              <a:srgbClr val="999999"/>
             </a:solidFill>
             <a:prstDash val="solid"/>
             <a:round/>
@@ -8548,22 +8241,30 @@
               <a:buNone/>
             </a:pPr>
             <a:r>
-              <a:rPr lang="en" sz="1600"/>
+              <a:rPr lang="en" sz="1600">
+                <a:solidFill>
+                  <a:srgbClr val="666666"/>
+                </a:solidFill>
+              </a:rPr>
               <a:t>Map reads to reference genome</a:t>
             </a:r>
-            <a:endParaRPr sz="1600"/>
+            <a:endParaRPr sz="1600">
+              <a:solidFill>
+                <a:srgbClr val="666666"/>
+              </a:solidFill>
+            </a:endParaRPr>
           </a:p>
         </p:txBody>
       </p:sp>
       <p:sp>
         <p:nvSpPr>
-          <p:cNvPr id="76" name="Google Shape;76;p16"/>
+          <p:cNvPr id="71" name="Google Shape;71;p15"/>
           <p:cNvSpPr/>
           <p:nvPr/>
         </p:nvSpPr>
         <p:spPr>
           <a:xfrm>
-            <a:off x="2856150" y="2516575"/>
+            <a:off x="625950" y="2954550"/>
             <a:ext cx="3431700" cy="635400"/>
           </a:xfrm>
           <a:prstGeom prst="roundRect">
@@ -8576,7 +8277,7 @@
           </a:solidFill>
           <a:ln cap="flat" cmpd="sng" w="9525">
             <a:solidFill>
-              <a:schemeClr val="dk2"/>
+              <a:schemeClr val="dk1"/>
             </a:solidFill>
             <a:prstDash val="solid"/>
             <a:round/>
@@ -8600,22 +8301,30 @@
               <a:buNone/>
             </a:pPr>
             <a:r>
-              <a:rPr lang="en" sz="1600"/>
+              <a:rPr lang="en" sz="1600">
+                <a:solidFill>
+                  <a:schemeClr val="dk1"/>
+                </a:solidFill>
+              </a:rPr>
               <a:t>Count reads</a:t>
             </a:r>
-            <a:endParaRPr sz="1600"/>
+            <a:endParaRPr sz="1600">
+              <a:solidFill>
+                <a:schemeClr val="dk1"/>
+              </a:solidFill>
+            </a:endParaRPr>
           </a:p>
         </p:txBody>
       </p:sp>
       <p:sp>
         <p:nvSpPr>
-          <p:cNvPr id="77" name="Google Shape;77;p16"/>
+          <p:cNvPr id="72" name="Google Shape;72;p15"/>
           <p:cNvSpPr/>
           <p:nvPr/>
         </p:nvSpPr>
         <p:spPr>
           <a:xfrm>
-            <a:off x="2856150" y="3821375"/>
+            <a:off x="625950" y="4259350"/>
             <a:ext cx="3431700" cy="635400"/>
           </a:xfrm>
           <a:prstGeom prst="roundRect">
@@ -8628,7 +8337,7 @@
           </a:solidFill>
           <a:ln cap="flat" cmpd="sng" w="9525">
             <a:solidFill>
-              <a:schemeClr val="dk2"/>
+              <a:schemeClr val="dk1"/>
             </a:solidFill>
             <a:prstDash val="solid"/>
             <a:round/>
@@ -8652,25 +8361,33 @@
               <a:buNone/>
             </a:pPr>
             <a:r>
-              <a:rPr lang="en" sz="1600"/>
+              <a:rPr lang="en" sz="1600">
+                <a:solidFill>
+                  <a:schemeClr val="dk1"/>
+                </a:solidFill>
+              </a:rPr>
               <a:t>Perform differential gene expression analysis</a:t>
             </a:r>
-            <a:endParaRPr sz="1600"/>
+            <a:endParaRPr sz="1600">
+              <a:solidFill>
+                <a:schemeClr val="dk1"/>
+              </a:solidFill>
+            </a:endParaRPr>
           </a:p>
         </p:txBody>
       </p:sp>
       <p:cxnSp>
         <p:nvCxnSpPr>
-          <p:cNvPr id="78" name="Google Shape;78;p16"/>
+          <p:cNvPr id="73" name="Google Shape;73;p15"/>
           <p:cNvCxnSpPr>
-            <a:stCxn id="75" idx="2"/>
-            <a:endCxn id="76" idx="0"/>
+            <a:stCxn id="70" idx="2"/>
+            <a:endCxn id="71" idx="0"/>
           </p:cNvCxnSpPr>
           <p:nvPr/>
         </p:nvCxnSpPr>
         <p:spPr>
           <a:xfrm>
-            <a:off x="4572000" y="1914950"/>
+            <a:off x="2341800" y="2352925"/>
             <a:ext cx="0" cy="601500"/>
           </a:xfrm>
           <a:prstGeom prst="straightConnector1">
@@ -8690,16 +8407,16 @@
       </p:cxnSp>
       <p:cxnSp>
         <p:nvCxnSpPr>
-          <p:cNvPr id="79" name="Google Shape;79;p16"/>
+          <p:cNvPr id="74" name="Google Shape;74;p15"/>
           <p:cNvCxnSpPr>
-            <a:stCxn id="76" idx="2"/>
-            <a:endCxn id="77" idx="0"/>
+            <a:stCxn id="71" idx="2"/>
+            <a:endCxn id="72" idx="0"/>
           </p:cNvCxnSpPr>
           <p:nvPr/>
         </p:nvCxnSpPr>
         <p:spPr>
           <a:xfrm>
-            <a:off x="4572000" y="3151975"/>
+            <a:off x="2341800" y="3589950"/>
             <a:ext cx="0" cy="669300"/>
           </a:xfrm>
           <a:prstGeom prst="straightConnector1">
@@ -8725,12 +8442,12 @@
 </p:sld>
 </file>
 
-<file path=ppt/slides/slide5.xml><?xml version="1.0" encoding="utf-8"?>
+<file path=ppt/slides/slide4.xml><?xml version="1.0" encoding="utf-8"?>
 <p:sld xmlns:a="http://schemas.openxmlformats.org/drawingml/2006/main" xmlns:r="http://schemas.openxmlformats.org/officeDocument/2006/relationships" xmlns:mc="http://schemas.openxmlformats.org/markup-compatibility/2006" xmlns:mv="urn:schemas-microsoft-com:mac:vml" xmlns:p="http://schemas.openxmlformats.org/presentationml/2006/main" xmlns:c="http://schemas.openxmlformats.org/drawingml/2006/chart" xmlns:dgm="http://schemas.openxmlformats.org/drawingml/2006/diagram" xmlns:o="urn:schemas-microsoft-com:office:office" xmlns:v="urn:schemas-microsoft-com:vml" xmlns:pvml="urn:schemas-microsoft-com:office:powerpoint" xmlns:com="http://schemas.openxmlformats.org/drawingml/2006/compatibility" xmlns:p14="http://schemas.microsoft.com/office/powerpoint/2010/main" xmlns:p15="http://schemas.microsoft.com/office/powerpoint/2012/main" xmlns:ahyp="http://schemas.microsoft.com/office/drawing/2018/hyperlinkcolor">
   <p:cSld>
     <p:spTree>
       <p:nvGrpSpPr>
-        <p:cNvPr id="83" name="Shape 83"/>
+        <p:cNvPr id="78" name="Shape 78"/>
         <p:cNvGrpSpPr/>
         <p:nvPr/>
       </p:nvGrpSpPr>
@@ -8744,7 +8461,7 @@
       </p:grpSpPr>
       <p:sp>
         <p:nvSpPr>
-          <p:cNvPr id="84" name="Google Shape;84;p17"/>
+          <p:cNvPr id="79" name="Google Shape;79;p16"/>
           <p:cNvSpPr txBox="1"/>
           <p:nvPr>
             <p:ph type="title"/>
@@ -8804,7 +8521,7 @@
       </p:sp>
       <p:pic>
         <p:nvPicPr>
-          <p:cNvPr id="85" name="Google Shape;85;p17"/>
+          <p:cNvPr id="80" name="Google Shape;80;p16"/>
           <p:cNvPicPr preferRelativeResize="0"/>
           <p:nvPr/>
         </p:nvPicPr>
@@ -8831,7 +8548,7 @@
       </p:pic>
       <p:sp>
         <p:nvSpPr>
-          <p:cNvPr id="86" name="Google Shape;86;p17"/>
+          <p:cNvPr id="81" name="Google Shape;81;p16"/>
           <p:cNvSpPr txBox="1"/>
           <p:nvPr/>
         </p:nvSpPr>
@@ -9465,7 +9182,7 @@
       </p:sp>
       <p:sp>
         <p:nvSpPr>
-          <p:cNvPr id="87" name="Google Shape;87;p17"/>
+          <p:cNvPr id="82" name="Google Shape;82;p16"/>
           <p:cNvSpPr txBox="1"/>
           <p:nvPr/>
         </p:nvSpPr>
@@ -9549,7 +9266,7 @@
       </p:sp>
       <p:sp>
         <p:nvSpPr>
-          <p:cNvPr id="88" name="Google Shape;88;p17"/>
+          <p:cNvPr id="83" name="Google Shape;83;p16"/>
           <p:cNvSpPr txBox="1"/>
           <p:nvPr/>
         </p:nvSpPr>
@@ -9653,7 +9370,7 @@
       </p:sp>
       <p:pic>
         <p:nvPicPr>
-          <p:cNvPr id="89" name="Google Shape;89;p17"/>
+          <p:cNvPr id="84" name="Google Shape;84;p16"/>
           <p:cNvPicPr preferRelativeResize="0"/>
           <p:nvPr/>
         </p:nvPicPr>
@@ -9686,12 +9403,12 @@
 </p:sld>
 </file>
 
-<file path=ppt/slides/slide6.xml><?xml version="1.0" encoding="utf-8"?>
+<file path=ppt/slides/slide5.xml><?xml version="1.0" encoding="utf-8"?>
 <p:sld xmlns:a="http://schemas.openxmlformats.org/drawingml/2006/main" xmlns:r="http://schemas.openxmlformats.org/officeDocument/2006/relationships" xmlns:mc="http://schemas.openxmlformats.org/markup-compatibility/2006" xmlns:mv="urn:schemas-microsoft-com:mac:vml" xmlns:p="http://schemas.openxmlformats.org/presentationml/2006/main" xmlns:c="http://schemas.openxmlformats.org/drawingml/2006/chart" xmlns:dgm="http://schemas.openxmlformats.org/drawingml/2006/diagram" xmlns:o="urn:schemas-microsoft-com:office:office" xmlns:v="urn:schemas-microsoft-com:vml" xmlns:pvml="urn:schemas-microsoft-com:office:powerpoint" xmlns:com="http://schemas.openxmlformats.org/drawingml/2006/compatibility" xmlns:p14="http://schemas.microsoft.com/office/powerpoint/2010/main" xmlns:p15="http://schemas.microsoft.com/office/powerpoint/2012/main" xmlns:ahyp="http://schemas.microsoft.com/office/drawing/2018/hyperlinkcolor">
   <p:cSld>
     <p:spTree>
       <p:nvGrpSpPr>
-        <p:cNvPr id="93" name="Shape 93"/>
+        <p:cNvPr id="88" name="Shape 88"/>
         <p:cNvGrpSpPr/>
         <p:nvPr/>
       </p:nvGrpSpPr>
@@ -9705,7 +9422,7 @@
       </p:grpSpPr>
       <p:sp>
         <p:nvSpPr>
-          <p:cNvPr id="94" name="Google Shape;94;p18"/>
+          <p:cNvPr id="89" name="Google Shape;89;p17"/>
           <p:cNvSpPr txBox="1"/>
           <p:nvPr>
             <p:ph type="title"/>
@@ -9757,7 +9474,7 @@
       </p:sp>
       <p:sp>
         <p:nvSpPr>
-          <p:cNvPr id="95" name="Google Shape;95;p18"/>
+          <p:cNvPr id="90" name="Google Shape;90;p17"/>
           <p:cNvSpPr txBox="1"/>
           <p:nvPr>
             <p:ph idx="1" type="body"/>
@@ -9830,7 +9547,7 @@
       </p:sp>
       <p:pic>
         <p:nvPicPr>
-          <p:cNvPr id="96" name="Google Shape;96;p18"/>
+          <p:cNvPr id="91" name="Google Shape;91;p17"/>
           <p:cNvPicPr preferRelativeResize="0"/>
           <p:nvPr/>
         </p:nvPicPr>
@@ -9857,7 +9574,7 @@
       </p:pic>
       <p:sp>
         <p:nvSpPr>
-          <p:cNvPr id="97" name="Google Shape;97;p18"/>
+          <p:cNvPr id="92" name="Google Shape;92;p17"/>
           <p:cNvSpPr txBox="1"/>
           <p:nvPr/>
         </p:nvSpPr>
@@ -9929,12 +9646,12 @@
 </p:sld>
 </file>
 
-<file path=ppt/slides/slide7.xml><?xml version="1.0" encoding="utf-8"?>
+<file path=ppt/slides/slide6.xml><?xml version="1.0" encoding="utf-8"?>
 <p:sld xmlns:a="http://schemas.openxmlformats.org/drawingml/2006/main" xmlns:r="http://schemas.openxmlformats.org/officeDocument/2006/relationships" xmlns:mc="http://schemas.openxmlformats.org/markup-compatibility/2006" xmlns:mv="urn:schemas-microsoft-com:mac:vml" xmlns:p="http://schemas.openxmlformats.org/presentationml/2006/main" xmlns:c="http://schemas.openxmlformats.org/drawingml/2006/chart" xmlns:dgm="http://schemas.openxmlformats.org/drawingml/2006/diagram" xmlns:o="urn:schemas-microsoft-com:office:office" xmlns:v="urn:schemas-microsoft-com:vml" xmlns:pvml="urn:schemas-microsoft-com:office:powerpoint" xmlns:com="http://schemas.openxmlformats.org/drawingml/2006/compatibility" xmlns:p14="http://schemas.microsoft.com/office/powerpoint/2010/main" xmlns:p15="http://schemas.microsoft.com/office/powerpoint/2012/main" xmlns:ahyp="http://schemas.microsoft.com/office/drawing/2018/hyperlinkcolor">
   <p:cSld>
     <p:spTree>
       <p:nvGrpSpPr>
-        <p:cNvPr id="101" name="Shape 101"/>
+        <p:cNvPr id="96" name="Shape 96"/>
         <p:cNvGrpSpPr/>
         <p:nvPr/>
       </p:nvGrpSpPr>
@@ -9948,7 +9665,7 @@
       </p:grpSpPr>
       <p:sp>
         <p:nvSpPr>
-          <p:cNvPr id="102" name="Google Shape;102;p19"/>
+          <p:cNvPr id="97" name="Google Shape;97;p18"/>
           <p:cNvSpPr txBox="1"/>
           <p:nvPr>
             <p:ph type="title"/>
@@ -9988,7 +9705,7 @@
       </p:sp>
       <p:grpSp>
         <p:nvGrpSpPr>
-          <p:cNvPr id="103" name="Google Shape;103;p19"/>
+          <p:cNvPr id="98" name="Google Shape;98;p18"/>
           <p:cNvGrpSpPr/>
           <p:nvPr/>
         </p:nvGrpSpPr>
@@ -10002,7 +9719,7 @@
         </p:grpSpPr>
         <p:pic>
           <p:nvPicPr>
-            <p:cNvPr id="104" name="Google Shape;104;p19"/>
+            <p:cNvPr id="99" name="Google Shape;99;p18"/>
             <p:cNvPicPr preferRelativeResize="0"/>
             <p:nvPr/>
           </p:nvPicPr>
@@ -10029,7 +9746,7 @@
         </p:pic>
         <p:sp>
           <p:nvSpPr>
-            <p:cNvPr id="105" name="Google Shape;105;p19"/>
+            <p:cNvPr id="100" name="Google Shape;100;p18"/>
             <p:cNvSpPr/>
             <p:nvPr/>
           </p:nvSpPr>
@@ -10079,7 +9796,7 @@
       </p:grpSp>
       <p:sp>
         <p:nvSpPr>
-          <p:cNvPr id="106" name="Google Shape;106;p19"/>
+          <p:cNvPr id="101" name="Google Shape;101;p18"/>
           <p:cNvSpPr/>
           <p:nvPr/>
         </p:nvSpPr>
@@ -10177,12 +9894,12 @@
 </p:sld>
 </file>
 
-<file path=ppt/slides/slide8.xml><?xml version="1.0" encoding="utf-8"?>
+<file path=ppt/slides/slide7.xml><?xml version="1.0" encoding="utf-8"?>
 <p:sld xmlns:a="http://schemas.openxmlformats.org/drawingml/2006/main" xmlns:r="http://schemas.openxmlformats.org/officeDocument/2006/relationships" xmlns:mc="http://schemas.openxmlformats.org/markup-compatibility/2006" xmlns:mv="urn:schemas-microsoft-com:mac:vml" xmlns:p="http://schemas.openxmlformats.org/presentationml/2006/main" xmlns:c="http://schemas.openxmlformats.org/drawingml/2006/chart" xmlns:dgm="http://schemas.openxmlformats.org/drawingml/2006/diagram" xmlns:o="urn:schemas-microsoft-com:office:office" xmlns:v="urn:schemas-microsoft-com:vml" xmlns:pvml="urn:schemas-microsoft-com:office:powerpoint" xmlns:com="http://schemas.openxmlformats.org/drawingml/2006/compatibility" xmlns:p14="http://schemas.microsoft.com/office/powerpoint/2010/main" xmlns:p15="http://schemas.microsoft.com/office/powerpoint/2012/main" xmlns:ahyp="http://schemas.microsoft.com/office/drawing/2018/hyperlinkcolor">
   <p:cSld>
     <p:spTree>
       <p:nvGrpSpPr>
-        <p:cNvPr id="110" name="Shape 110"/>
+        <p:cNvPr id="105" name="Shape 105"/>
         <p:cNvGrpSpPr/>
         <p:nvPr/>
       </p:nvGrpSpPr>
@@ -10196,7 +9913,7 @@
       </p:grpSpPr>
       <p:pic>
         <p:nvPicPr>
-          <p:cNvPr id="111" name="Google Shape;111;p20"/>
+          <p:cNvPr id="106" name="Google Shape;106;p19"/>
           <p:cNvPicPr preferRelativeResize="0"/>
           <p:nvPr/>
         </p:nvPicPr>
@@ -10223,7 +9940,7 @@
       </p:pic>
       <p:sp>
         <p:nvSpPr>
-          <p:cNvPr id="112" name="Google Shape;112;p20"/>
+          <p:cNvPr id="107" name="Google Shape;107;p19"/>
           <p:cNvSpPr/>
           <p:nvPr/>
         </p:nvSpPr>
@@ -10272,7 +9989,7 @@
       </p:sp>
       <p:sp>
         <p:nvSpPr>
-          <p:cNvPr id="113" name="Google Shape;113;p20"/>
+          <p:cNvPr id="108" name="Google Shape;108;p19"/>
           <p:cNvSpPr txBox="1"/>
           <p:nvPr/>
         </p:nvSpPr>
@@ -10322,7 +10039,7 @@
       </p:sp>
       <p:sp>
         <p:nvSpPr>
-          <p:cNvPr id="114" name="Google Shape;114;p20"/>
+          <p:cNvPr id="109" name="Google Shape;109;p19"/>
           <p:cNvSpPr/>
           <p:nvPr/>
         </p:nvSpPr>
@@ -10414,7 +10131,7 @@
       </p:sp>
       <p:sp>
         <p:nvSpPr>
-          <p:cNvPr id="115" name="Google Shape;115;p20"/>
+          <p:cNvPr id="110" name="Google Shape;110;p19"/>
           <p:cNvSpPr txBox="1"/>
           <p:nvPr>
             <p:ph type="title"/>
@@ -10460,12 +10177,12 @@
 </p:sld>
 </file>
 
-<file path=ppt/slides/slide9.xml><?xml version="1.0" encoding="utf-8"?>
+<file path=ppt/slides/slide8.xml><?xml version="1.0" encoding="utf-8"?>
 <p:sld xmlns:a="http://schemas.openxmlformats.org/drawingml/2006/main" xmlns:r="http://schemas.openxmlformats.org/officeDocument/2006/relationships" xmlns:mc="http://schemas.openxmlformats.org/markup-compatibility/2006" xmlns:mv="urn:schemas-microsoft-com:mac:vml" xmlns:p="http://schemas.openxmlformats.org/presentationml/2006/main" xmlns:c="http://schemas.openxmlformats.org/drawingml/2006/chart" xmlns:dgm="http://schemas.openxmlformats.org/drawingml/2006/diagram" xmlns:o="urn:schemas-microsoft-com:office:office" xmlns:v="urn:schemas-microsoft-com:vml" xmlns:pvml="urn:schemas-microsoft-com:office:powerpoint" xmlns:com="http://schemas.openxmlformats.org/drawingml/2006/compatibility" xmlns:p14="http://schemas.microsoft.com/office/powerpoint/2010/main" xmlns:p15="http://schemas.microsoft.com/office/powerpoint/2012/main" xmlns:ahyp="http://schemas.microsoft.com/office/drawing/2018/hyperlinkcolor">
   <p:cSld>
     <p:spTree>
       <p:nvGrpSpPr>
-        <p:cNvPr id="119" name="Shape 119"/>
+        <p:cNvPr id="114" name="Shape 114"/>
         <p:cNvGrpSpPr/>
         <p:nvPr/>
       </p:nvGrpSpPr>
@@ -10479,7 +10196,7 @@
       </p:grpSpPr>
       <p:sp>
         <p:nvSpPr>
-          <p:cNvPr id="120" name="Google Shape;120;p21"/>
+          <p:cNvPr id="115" name="Google Shape;115;p20"/>
           <p:cNvSpPr txBox="1"/>
           <p:nvPr>
             <p:ph type="title"/>
@@ -10547,7 +10264,7 @@
       </p:sp>
       <p:sp>
         <p:nvSpPr>
-          <p:cNvPr id="121" name="Google Shape;121;p21"/>
+          <p:cNvPr id="116" name="Google Shape;116;p20"/>
           <p:cNvSpPr txBox="1"/>
           <p:nvPr>
             <p:ph idx="1" type="body"/>
@@ -10752,7 +10469,452 @@
 </p:sld>
 </file>
 
+<file path=ppt/slides/slide9.xml><?xml version="1.0" encoding="utf-8"?>
+<p:sld xmlns:a="http://schemas.openxmlformats.org/drawingml/2006/main" xmlns:r="http://schemas.openxmlformats.org/officeDocument/2006/relationships" xmlns:mc="http://schemas.openxmlformats.org/markup-compatibility/2006" xmlns:mv="urn:schemas-microsoft-com:mac:vml" xmlns:p="http://schemas.openxmlformats.org/presentationml/2006/main" xmlns:c="http://schemas.openxmlformats.org/drawingml/2006/chart" xmlns:dgm="http://schemas.openxmlformats.org/drawingml/2006/diagram" xmlns:o="urn:schemas-microsoft-com:office:office" xmlns:v="urn:schemas-microsoft-com:vml" xmlns:pvml="urn:schemas-microsoft-com:office:powerpoint" xmlns:com="http://schemas.openxmlformats.org/drawingml/2006/compatibility" xmlns:p14="http://schemas.microsoft.com/office/powerpoint/2010/main" xmlns:p15="http://schemas.microsoft.com/office/powerpoint/2012/main" xmlns:ahyp="http://schemas.microsoft.com/office/drawing/2018/hyperlinkcolor">
+  <p:cSld>
+    <p:spTree>
+      <p:nvGrpSpPr>
+        <p:cNvPr id="120" name="Shape 120"/>
+        <p:cNvGrpSpPr/>
+        <p:nvPr/>
+      </p:nvGrpSpPr>
+      <p:grpSpPr>
+        <a:xfrm>
+          <a:off x="0" y="0"/>
+          <a:ext cx="0" cy="0"/>
+          <a:chOff x="0" y="0"/>
+          <a:chExt cx="0" cy="0"/>
+        </a:xfrm>
+      </p:grpSpPr>
+      <p:sp>
+        <p:nvSpPr>
+          <p:cNvPr id="121" name="Google Shape;121;p21"/>
+          <p:cNvSpPr txBox="1"/>
+          <p:nvPr>
+            <p:ph type="title"/>
+          </p:nvPr>
+        </p:nvSpPr>
+        <p:spPr>
+          <a:xfrm>
+            <a:off x="311700" y="445025"/>
+            <a:ext cx="8520600" cy="572700"/>
+          </a:xfrm>
+          <a:prstGeom prst="rect">
+            <a:avLst/>
+          </a:prstGeom>
+        </p:spPr>
+        <p:txBody>
+          <a:bodyPr anchorCtr="0" anchor="t" bIns="91425" lIns="91425" spcFirstLastPara="1" rIns="91425" wrap="square" tIns="91425">
+            <a:normAutofit fontScale="90000"/>
+          </a:bodyPr>
+          <a:lstStyle/>
+          <a:p>
+            <a:pPr indent="0" lvl="0" marL="0" rtl="0" algn="ctr">
+              <a:spcBef>
+                <a:spcPts val="0"/>
+              </a:spcBef>
+              <a:spcAft>
+                <a:spcPts val="0"/>
+              </a:spcAft>
+              <a:buNone/>
+            </a:pPr>
+            <a:r>
+              <a:rPr lang="en"/>
+              <a:t>Challenge Question</a:t>
+            </a:r>
+            <a:endParaRPr/>
+          </a:p>
+        </p:txBody>
+      </p:sp>
+      <p:sp>
+        <p:nvSpPr>
+          <p:cNvPr id="122" name="Google Shape;122;p21"/>
+          <p:cNvSpPr txBox="1"/>
+          <p:nvPr>
+            <p:ph idx="1" type="body"/>
+          </p:nvPr>
+        </p:nvSpPr>
+        <p:spPr>
+          <a:xfrm>
+            <a:off x="311700" y="1152475"/>
+            <a:ext cx="8520600" cy="3416400"/>
+          </a:xfrm>
+          <a:prstGeom prst="rect">
+            <a:avLst/>
+          </a:prstGeom>
+        </p:spPr>
+        <p:txBody>
+          <a:bodyPr anchorCtr="0" anchor="t" bIns="91425" lIns="91425" spcFirstLastPara="1" rIns="91425" wrap="square" tIns="91425">
+            <a:normAutofit/>
+          </a:bodyPr>
+          <a:lstStyle/>
+          <a:p>
+            <a:pPr indent="-355600" lvl="0" marL="457200" rtl="0" algn="l">
+              <a:spcBef>
+                <a:spcPts val="0"/>
+              </a:spcBef>
+              <a:spcAft>
+                <a:spcPts val="0"/>
+              </a:spcAft>
+              <a:buSzPts val="2000"/>
+              <a:buChar char="●"/>
+            </a:pPr>
+            <a:r>
+              <a:rPr lang="en" sz="2000"/>
+              <a:t>What feature would you used to count reads for RNA-seq?</a:t>
+            </a:r>
+            <a:endParaRPr sz="2000"/>
+          </a:p>
+          <a:p>
+            <a:pPr indent="-355600" lvl="0" marL="457200" rtl="0" algn="l">
+              <a:lnSpc>
+                <a:spcPct val="150000"/>
+              </a:lnSpc>
+              <a:spcBef>
+                <a:spcPts val="0"/>
+              </a:spcBef>
+              <a:spcAft>
+                <a:spcPts val="0"/>
+              </a:spcAft>
+              <a:buSzPts val="2000"/>
+              <a:buAutoNum type="alphaUcPeriod"/>
+            </a:pPr>
+            <a:r>
+              <a:rPr lang="en" sz="2000"/>
+              <a:t>Gene</a:t>
+            </a:r>
+            <a:endParaRPr sz="2000"/>
+          </a:p>
+          <a:p>
+            <a:pPr indent="-355600" lvl="0" marL="457200" rtl="0" algn="l">
+              <a:lnSpc>
+                <a:spcPct val="150000"/>
+              </a:lnSpc>
+              <a:spcBef>
+                <a:spcPts val="0"/>
+              </a:spcBef>
+              <a:spcAft>
+                <a:spcPts val="0"/>
+              </a:spcAft>
+              <a:buSzPts val="2000"/>
+              <a:buAutoNum type="alphaUcPeriod"/>
+            </a:pPr>
+            <a:r>
+              <a:rPr lang="en" sz="2000"/>
+              <a:t>Exon</a:t>
+            </a:r>
+            <a:endParaRPr sz="2000"/>
+          </a:p>
+          <a:p>
+            <a:pPr indent="-355600" lvl="0" marL="457200" rtl="0" algn="l">
+              <a:lnSpc>
+                <a:spcPct val="150000"/>
+              </a:lnSpc>
+              <a:spcBef>
+                <a:spcPts val="0"/>
+              </a:spcBef>
+              <a:spcAft>
+                <a:spcPts val="0"/>
+              </a:spcAft>
+              <a:buSzPts val="2000"/>
+              <a:buAutoNum type="alphaUcPeriod"/>
+            </a:pPr>
+            <a:r>
+              <a:rPr lang="en" sz="2000"/>
+              <a:t>Transcripts</a:t>
+            </a:r>
+            <a:endParaRPr sz="2000"/>
+          </a:p>
+        </p:txBody>
+      </p:sp>
+    </p:spTree>
+  </p:cSld>
+  <p:clrMapOvr>
+    <a:masterClrMapping/>
+  </p:clrMapOvr>
+</p:sld>
+</file>
+
 <file path=ppt/theme/theme1.xml><?xml version="1.0" encoding="utf-8"?>
+<a:theme xmlns:a="http://schemas.openxmlformats.org/drawingml/2006/main" xmlns:r="http://schemas.openxmlformats.org/officeDocument/2006/relationships" name="Simple Light">
+  <a:themeElements>
+    <a:clrScheme name="Simple Light">
+      <a:dk1>
+        <a:srgbClr val="000000"/>
+      </a:dk1>
+      <a:lt1>
+        <a:srgbClr val="FFFFFF"/>
+      </a:lt1>
+      <a:dk2>
+        <a:srgbClr val="595959"/>
+      </a:dk2>
+      <a:lt2>
+        <a:srgbClr val="EEEEEE"/>
+      </a:lt2>
+      <a:accent1>
+        <a:srgbClr val="4285F4"/>
+      </a:accent1>
+      <a:accent2>
+        <a:srgbClr val="212121"/>
+      </a:accent2>
+      <a:accent3>
+        <a:srgbClr val="78909C"/>
+      </a:accent3>
+      <a:accent4>
+        <a:srgbClr val="FFAB40"/>
+      </a:accent4>
+      <a:accent5>
+        <a:srgbClr val="0097A7"/>
+      </a:accent5>
+      <a:accent6>
+        <a:srgbClr val="EEFF41"/>
+      </a:accent6>
+      <a:hlink>
+        <a:srgbClr val="0097A7"/>
+      </a:hlink>
+      <a:folHlink>
+        <a:srgbClr val="0097A7"/>
+      </a:folHlink>
+    </a:clrScheme>
+    <a:fontScheme name="Office">
+      <a:majorFont>
+        <a:latin typeface="Arial"/>
+        <a:ea typeface=""/>
+        <a:cs typeface=""/>
+        <a:font script="Jpan" typeface="ＭＳ Ｐゴシック"/>
+        <a:font script="Hang" typeface="맑은 고딕"/>
+        <a:font script="Hans" typeface="宋体"/>
+        <a:font script="Hant" typeface="新細明體"/>
+        <a:font script="Arab" typeface="Times New Roman"/>
+        <a:font script="Hebr" typeface="Times New Roman"/>
+        <a:font script="Thai" typeface="Angsana New"/>
+        <a:font script="Ethi" typeface="Nyala"/>
+        <a:font script="Beng" typeface="Vrinda"/>
+        <a:font script="Gujr" typeface="Shruti"/>
+        <a:font script="Khmr" typeface="MoolBoran"/>
+        <a:font script="Knda" typeface="Tunga"/>
+        <a:font script="Guru" typeface="Raavi"/>
+        <a:font script="Cans" typeface="Euphemia"/>
+        <a:font script="Cher" typeface="Plantagenet Cherokee"/>
+        <a:font script="Yiii" typeface="Microsoft Yi Baiti"/>
+        <a:font script="Tibt" typeface="Microsoft Himalaya"/>
+        <a:font script="Thaa" typeface="MV Boli"/>
+        <a:font script="Deva" typeface="Mangal"/>
+        <a:font script="Telu" typeface="Gautami"/>
+        <a:font script="Taml" typeface="Latha"/>
+        <a:font script="Syrc" typeface="Estrangelo Edessa"/>
+        <a:font script="Orya" typeface="Kalinga"/>
+        <a:font script="Mlym" typeface="Kartika"/>
+        <a:font script="Laoo" typeface="DokChampa"/>
+        <a:font script="Sinh" typeface="Iskoola Pota"/>
+        <a:font script="Mong" typeface="Mongolian Baiti"/>
+        <a:font script="Viet" typeface="Times New Roman"/>
+        <a:font script="Uigh" typeface="Microsoft Uighur"/>
+        <a:font script="Geor" typeface="Sylfaen"/>
+      </a:majorFont>
+      <a:minorFont>
+        <a:latin typeface="Arial"/>
+        <a:ea typeface=""/>
+        <a:cs typeface=""/>
+        <a:font script="Jpan" typeface="ＭＳ Ｐゴシック"/>
+        <a:font script="Hang" typeface="맑은 고딕"/>
+        <a:font script="Hans" typeface="宋体"/>
+        <a:font script="Hant" typeface="新細明體"/>
+        <a:font script="Arab" typeface="Arial"/>
+        <a:font script="Hebr" typeface="Arial"/>
+        <a:font script="Thai" typeface="Cordia New"/>
+        <a:font script="Ethi" typeface="Nyala"/>
+        <a:font script="Beng" typeface="Vrinda"/>
+        <a:font script="Gujr" typeface="Shruti"/>
+        <a:font script="Khmr" typeface="DaunPenh"/>
+        <a:font script="Knda" typeface="Tunga"/>
+        <a:font script="Guru" typeface="Raavi"/>
+        <a:font script="Cans" typeface="Euphemia"/>
+        <a:font script="Cher" typeface="Plantagenet Cherokee"/>
+        <a:font script="Yiii" typeface="Microsoft Yi Baiti"/>
+        <a:font script="Tibt" typeface="Microsoft Himalaya"/>
+        <a:font script="Thaa" typeface="MV Boli"/>
+        <a:font script="Deva" typeface="Mangal"/>
+        <a:font script="Telu" typeface="Gautami"/>
+        <a:font script="Taml" typeface="Latha"/>
+        <a:font script="Syrc" typeface="Estrangelo Edessa"/>
+        <a:font script="Orya" typeface="Kalinga"/>
+        <a:font script="Mlym" typeface="Kartika"/>
+        <a:font script="Laoo" typeface="DokChampa"/>
+        <a:font script="Sinh" typeface="Iskoola Pota"/>
+        <a:font script="Mong" typeface="Mongolian Baiti"/>
+        <a:font script="Viet" typeface="Arial"/>
+        <a:font script="Uigh" typeface="Microsoft Uighur"/>
+        <a:font script="Geor" typeface="Sylfaen"/>
+      </a:minorFont>
+    </a:fontScheme>
+    <a:fmtScheme name="Office">
+      <a:fillStyleLst>
+        <a:solidFill>
+          <a:schemeClr val="phClr"/>
+        </a:solidFill>
+        <a:gradFill rotWithShape="1">
+          <a:gsLst>
+            <a:gs pos="0">
+              <a:schemeClr val="phClr">
+                <a:tint val="50000"/>
+                <a:satMod val="300000"/>
+              </a:schemeClr>
+            </a:gs>
+            <a:gs pos="35000">
+              <a:schemeClr val="phClr">
+                <a:tint val="37000"/>
+                <a:satMod val="300000"/>
+              </a:schemeClr>
+            </a:gs>
+            <a:gs pos="100000">
+              <a:schemeClr val="phClr">
+                <a:tint val="15000"/>
+                <a:satMod val="350000"/>
+              </a:schemeClr>
+            </a:gs>
+          </a:gsLst>
+          <a:lin ang="16200000" scaled="1"/>
+        </a:gradFill>
+        <a:gradFill rotWithShape="1">
+          <a:gsLst>
+            <a:gs pos="0">
+              <a:schemeClr val="phClr">
+                <a:tint val="100000"/>
+                <a:shade val="100000"/>
+                <a:satMod val="130000"/>
+              </a:schemeClr>
+            </a:gs>
+            <a:gs pos="100000">
+              <a:schemeClr val="phClr">
+                <a:tint val="50000"/>
+                <a:shade val="100000"/>
+                <a:satMod val="350000"/>
+              </a:schemeClr>
+            </a:gs>
+          </a:gsLst>
+          <a:lin ang="16200000" scaled="0"/>
+        </a:gradFill>
+      </a:fillStyleLst>
+      <a:lnStyleLst>
+        <a:ln w="9525" cap="flat" cmpd="sng" algn="ctr">
+          <a:solidFill>
+            <a:schemeClr val="phClr">
+              <a:shade val="95000"/>
+              <a:satMod val="105000"/>
+            </a:schemeClr>
+          </a:solidFill>
+          <a:prstDash val="solid"/>
+        </a:ln>
+        <a:ln w="25400" cap="flat" cmpd="sng" algn="ctr">
+          <a:solidFill>
+            <a:schemeClr val="phClr"/>
+          </a:solidFill>
+          <a:prstDash val="solid"/>
+        </a:ln>
+        <a:ln w="38100" cap="flat" cmpd="sng" algn="ctr">
+          <a:solidFill>
+            <a:schemeClr val="phClr"/>
+          </a:solidFill>
+          <a:prstDash val="solid"/>
+        </a:ln>
+      </a:lnStyleLst>
+      <a:effectStyleLst>
+        <a:effectStyle>
+          <a:effectLst>
+            <a:outerShdw blurRad="40000" dist="20000" dir="5400000" rotWithShape="0">
+              <a:srgbClr val="000000">
+                <a:alpha val="38000"/>
+              </a:srgbClr>
+            </a:outerShdw>
+          </a:effectLst>
+        </a:effectStyle>
+        <a:effectStyle>
+          <a:effectLst>
+            <a:outerShdw blurRad="40000" dist="23000" dir="5400000" rotWithShape="0">
+              <a:srgbClr val="000000">
+                <a:alpha val="35000"/>
+              </a:srgbClr>
+            </a:outerShdw>
+          </a:effectLst>
+        </a:effectStyle>
+        <a:effectStyle>
+          <a:effectLst>
+            <a:outerShdw blurRad="40000" dist="23000" dir="5400000" rotWithShape="0">
+              <a:srgbClr val="000000">
+                <a:alpha val="35000"/>
+              </a:srgbClr>
+            </a:outerShdw>
+          </a:effectLst>
+          <a:scene3d>
+            <a:camera prst="orthographicFront">
+              <a:rot lat="0" lon="0" rev="0"/>
+            </a:camera>
+            <a:lightRig rig="threePt" dir="t">
+              <a:rot lat="0" lon="0" rev="1200000"/>
+            </a:lightRig>
+          </a:scene3d>
+          <a:sp3d>
+            <a:bevelT w="63500" h="25400"/>
+          </a:sp3d>
+        </a:effectStyle>
+      </a:effectStyleLst>
+      <a:bgFillStyleLst>
+        <a:solidFill>
+          <a:schemeClr val="phClr"/>
+        </a:solidFill>
+        <a:gradFill rotWithShape="1">
+          <a:gsLst>
+            <a:gs pos="0">
+              <a:schemeClr val="phClr">
+                <a:tint val="40000"/>
+                <a:satMod val="350000"/>
+              </a:schemeClr>
+            </a:gs>
+            <a:gs pos="40000">
+              <a:schemeClr val="phClr">
+                <a:tint val="45000"/>
+                <a:shade val="99000"/>
+                <a:satMod val="350000"/>
+              </a:schemeClr>
+            </a:gs>
+            <a:gs pos="100000">
+              <a:schemeClr val="phClr">
+                <a:shade val="20000"/>
+                <a:satMod val="255000"/>
+              </a:schemeClr>
+            </a:gs>
+          </a:gsLst>
+          <a:path path="circle">
+            <a:fillToRect l="50000" t="-80000" r="50000" b="180000"/>
+          </a:path>
+        </a:gradFill>
+        <a:gradFill rotWithShape="1">
+          <a:gsLst>
+            <a:gs pos="0">
+              <a:schemeClr val="phClr">
+                <a:tint val="80000"/>
+                <a:satMod val="300000"/>
+              </a:schemeClr>
+            </a:gs>
+            <a:gs pos="100000">
+              <a:schemeClr val="phClr">
+                <a:shade val="30000"/>
+                <a:satMod val="200000"/>
+              </a:schemeClr>
+            </a:gs>
+          </a:gsLst>
+          <a:path path="circle">
+            <a:fillToRect l="50000" t="50000" r="50000" b="50000"/>
+          </a:path>
+        </a:gradFill>
+      </a:bgFillStyleLst>
+    </a:fmtScheme>
+  </a:themeElements>
+</a:theme>
+</file>
+
+<file path=ppt/theme/theme2.xml><?xml version="1.0" encoding="utf-8"?>
 <a:theme xmlns:a="http://schemas.openxmlformats.org/drawingml/2006/main" xmlns:r="http://schemas.openxmlformats.org/officeDocument/2006/relationships">
   <a:themeElements>
     <a:clrScheme name="Default">
@@ -11029,283 +11191,4 @@
     </a:fmtScheme>
   </a:themeElements>
 </a:theme>
-</file>
-
-<file path=ppt/theme/theme2.xml><?xml version="1.0" encoding="utf-8"?>
-<a:theme xmlns:a="http://schemas.openxmlformats.org/drawingml/2006/main" xmlns:r="http://schemas.openxmlformats.org/officeDocument/2006/relationships" name="Simple Light">
-  <a:themeElements>
-    <a:clrScheme name="Simple Light">
-      <a:dk1>
-        <a:srgbClr val="000000"/>
-      </a:dk1>
-      <a:lt1>
-        <a:srgbClr val="FFFFFF"/>
-      </a:lt1>
-      <a:dk2>
-        <a:srgbClr val="595959"/>
-      </a:dk2>
-      <a:lt2>
-        <a:srgbClr val="EEEEEE"/>
-      </a:lt2>
-      <a:accent1>
-        <a:srgbClr val="4285F4"/>
-      </a:accent1>
-      <a:accent2>
-        <a:srgbClr val="212121"/>
-      </a:accent2>
-      <a:accent3>
-        <a:srgbClr val="78909C"/>
-      </a:accent3>
-      <a:accent4>
-        <a:srgbClr val="FFAB40"/>
-      </a:accent4>
-      <a:accent5>
-        <a:srgbClr val="0097A7"/>
-      </a:accent5>
-      <a:accent6>
-        <a:srgbClr val="EEFF41"/>
-      </a:accent6>
-      <a:hlink>
-        <a:srgbClr val="0097A7"/>
-      </a:hlink>
-      <a:folHlink>
-        <a:srgbClr val="0097A7"/>
-      </a:folHlink>
-    </a:clrScheme>
-    <a:fontScheme name="Office">
-      <a:majorFont>
-        <a:latin typeface="Arial"/>
-        <a:ea typeface=""/>
-        <a:cs typeface=""/>
-        <a:font script="Jpan" typeface="ＭＳ Ｐゴシック"/>
-        <a:font script="Hang" typeface="맑은 고딕"/>
-        <a:font script="Hans" typeface="宋体"/>
-        <a:font script="Hant" typeface="新細明體"/>
-        <a:font script="Arab" typeface="Times New Roman"/>
-        <a:font script="Hebr" typeface="Times New Roman"/>
-        <a:font script="Thai" typeface="Angsana New"/>
-        <a:font script="Ethi" typeface="Nyala"/>
-        <a:font script="Beng" typeface="Vrinda"/>
-        <a:font script="Gujr" typeface="Shruti"/>
-        <a:font script="Khmr" typeface="MoolBoran"/>
-        <a:font script="Knda" typeface="Tunga"/>
-        <a:font script="Guru" typeface="Raavi"/>
-        <a:font script="Cans" typeface="Euphemia"/>
-        <a:font script="Cher" typeface="Plantagenet Cherokee"/>
-        <a:font script="Yiii" typeface="Microsoft Yi Baiti"/>
-        <a:font script="Tibt" typeface="Microsoft Himalaya"/>
-        <a:font script="Thaa" typeface="MV Boli"/>
-        <a:font script="Deva" typeface="Mangal"/>
-        <a:font script="Telu" typeface="Gautami"/>
-        <a:font script="Taml" typeface="Latha"/>
-        <a:font script="Syrc" typeface="Estrangelo Edessa"/>
-        <a:font script="Orya" typeface="Kalinga"/>
-        <a:font script="Mlym" typeface="Kartika"/>
-        <a:font script="Laoo" typeface="DokChampa"/>
-        <a:font script="Sinh" typeface="Iskoola Pota"/>
-        <a:font script="Mong" typeface="Mongolian Baiti"/>
-        <a:font script="Viet" typeface="Times New Roman"/>
-        <a:font script="Uigh" typeface="Microsoft Uighur"/>
-        <a:font script="Geor" typeface="Sylfaen"/>
-      </a:majorFont>
-      <a:minorFont>
-        <a:latin typeface="Arial"/>
-        <a:ea typeface=""/>
-        <a:cs typeface=""/>
-        <a:font script="Jpan" typeface="ＭＳ Ｐゴシック"/>
-        <a:font script="Hang" typeface="맑은 고딕"/>
-        <a:font script="Hans" typeface="宋体"/>
-        <a:font script="Hant" typeface="新細明體"/>
-        <a:font script="Arab" typeface="Arial"/>
-        <a:font script="Hebr" typeface="Arial"/>
-        <a:font script="Thai" typeface="Cordia New"/>
-        <a:font script="Ethi" typeface="Nyala"/>
-        <a:font script="Beng" typeface="Vrinda"/>
-        <a:font script="Gujr" typeface="Shruti"/>
-        <a:font script="Khmr" typeface="DaunPenh"/>
-        <a:font script="Knda" typeface="Tunga"/>
-        <a:font script="Guru" typeface="Raavi"/>
-        <a:font script="Cans" typeface="Euphemia"/>
-        <a:font script="Cher" typeface="Plantagenet Cherokee"/>
-        <a:font script="Yiii" typeface="Microsoft Yi Baiti"/>
-        <a:font script="Tibt" typeface="Microsoft Himalaya"/>
-        <a:font script="Thaa" typeface="MV Boli"/>
-        <a:font script="Deva" typeface="Mangal"/>
-        <a:font script="Telu" typeface="Gautami"/>
-        <a:font script="Taml" typeface="Latha"/>
-        <a:font script="Syrc" typeface="Estrangelo Edessa"/>
-        <a:font script="Orya" typeface="Kalinga"/>
-        <a:font script="Mlym" typeface="Kartika"/>
-        <a:font script="Laoo" typeface="DokChampa"/>
-        <a:font script="Sinh" typeface="Iskoola Pota"/>
-        <a:font script="Mong" typeface="Mongolian Baiti"/>
-        <a:font script="Viet" typeface="Arial"/>
-        <a:font script="Uigh" typeface="Microsoft Uighur"/>
-        <a:font script="Geor" typeface="Sylfaen"/>
-      </a:minorFont>
-    </a:fontScheme>
-    <a:fmtScheme name="Office">
-      <a:fillStyleLst>
-        <a:solidFill>
-          <a:schemeClr val="phClr"/>
-        </a:solidFill>
-        <a:gradFill rotWithShape="1">
-          <a:gsLst>
-            <a:gs pos="0">
-              <a:schemeClr val="phClr">
-                <a:tint val="50000"/>
-                <a:satMod val="300000"/>
-              </a:schemeClr>
-            </a:gs>
-            <a:gs pos="35000">
-              <a:schemeClr val="phClr">
-                <a:tint val="37000"/>
-                <a:satMod val="300000"/>
-              </a:schemeClr>
-            </a:gs>
-            <a:gs pos="100000">
-              <a:schemeClr val="phClr">
-                <a:tint val="15000"/>
-                <a:satMod val="350000"/>
-              </a:schemeClr>
-            </a:gs>
-          </a:gsLst>
-          <a:lin ang="16200000" scaled="1"/>
-        </a:gradFill>
-        <a:gradFill rotWithShape="1">
-          <a:gsLst>
-            <a:gs pos="0">
-              <a:schemeClr val="phClr">
-                <a:tint val="100000"/>
-                <a:shade val="100000"/>
-                <a:satMod val="130000"/>
-              </a:schemeClr>
-            </a:gs>
-            <a:gs pos="100000">
-              <a:schemeClr val="phClr">
-                <a:tint val="50000"/>
-                <a:shade val="100000"/>
-                <a:satMod val="350000"/>
-              </a:schemeClr>
-            </a:gs>
-          </a:gsLst>
-          <a:lin ang="16200000" scaled="0"/>
-        </a:gradFill>
-      </a:fillStyleLst>
-      <a:lnStyleLst>
-        <a:ln w="9525" cap="flat" cmpd="sng" algn="ctr">
-          <a:solidFill>
-            <a:schemeClr val="phClr">
-              <a:shade val="95000"/>
-              <a:satMod val="105000"/>
-            </a:schemeClr>
-          </a:solidFill>
-          <a:prstDash val="solid"/>
-        </a:ln>
-        <a:ln w="25400" cap="flat" cmpd="sng" algn="ctr">
-          <a:solidFill>
-            <a:schemeClr val="phClr"/>
-          </a:solidFill>
-          <a:prstDash val="solid"/>
-        </a:ln>
-        <a:ln w="38100" cap="flat" cmpd="sng" algn="ctr">
-          <a:solidFill>
-            <a:schemeClr val="phClr"/>
-          </a:solidFill>
-          <a:prstDash val="solid"/>
-        </a:ln>
-      </a:lnStyleLst>
-      <a:effectStyleLst>
-        <a:effectStyle>
-          <a:effectLst>
-            <a:outerShdw blurRad="40000" dist="20000" dir="5400000" rotWithShape="0">
-              <a:srgbClr val="000000">
-                <a:alpha val="38000"/>
-              </a:srgbClr>
-            </a:outerShdw>
-          </a:effectLst>
-        </a:effectStyle>
-        <a:effectStyle>
-          <a:effectLst>
-            <a:outerShdw blurRad="40000" dist="23000" dir="5400000" rotWithShape="0">
-              <a:srgbClr val="000000">
-                <a:alpha val="35000"/>
-              </a:srgbClr>
-            </a:outerShdw>
-          </a:effectLst>
-        </a:effectStyle>
-        <a:effectStyle>
-          <a:effectLst>
-            <a:outerShdw blurRad="40000" dist="23000" dir="5400000" rotWithShape="0">
-              <a:srgbClr val="000000">
-                <a:alpha val="35000"/>
-              </a:srgbClr>
-            </a:outerShdw>
-          </a:effectLst>
-          <a:scene3d>
-            <a:camera prst="orthographicFront">
-              <a:rot lat="0" lon="0" rev="0"/>
-            </a:camera>
-            <a:lightRig rig="threePt" dir="t">
-              <a:rot lat="0" lon="0" rev="1200000"/>
-            </a:lightRig>
-          </a:scene3d>
-          <a:sp3d>
-            <a:bevelT w="63500" h="25400"/>
-          </a:sp3d>
-        </a:effectStyle>
-      </a:effectStyleLst>
-      <a:bgFillStyleLst>
-        <a:solidFill>
-          <a:schemeClr val="phClr"/>
-        </a:solidFill>
-        <a:gradFill rotWithShape="1">
-          <a:gsLst>
-            <a:gs pos="0">
-              <a:schemeClr val="phClr">
-                <a:tint val="40000"/>
-                <a:satMod val="350000"/>
-              </a:schemeClr>
-            </a:gs>
-            <a:gs pos="40000">
-              <a:schemeClr val="phClr">
-                <a:tint val="45000"/>
-                <a:shade val="99000"/>
-                <a:satMod val="350000"/>
-              </a:schemeClr>
-            </a:gs>
-            <a:gs pos="100000">
-              <a:schemeClr val="phClr">
-                <a:shade val="20000"/>
-                <a:satMod val="255000"/>
-              </a:schemeClr>
-            </a:gs>
-          </a:gsLst>
-          <a:path path="circle">
-            <a:fillToRect l="50000" t="-80000" r="50000" b="180000"/>
-          </a:path>
-        </a:gradFill>
-        <a:gradFill rotWithShape="1">
-          <a:gsLst>
-            <a:gs pos="0">
-              <a:schemeClr val="phClr">
-                <a:tint val="80000"/>
-                <a:satMod val="300000"/>
-              </a:schemeClr>
-            </a:gs>
-            <a:gs pos="100000">
-              <a:schemeClr val="phClr">
-                <a:shade val="30000"/>
-                <a:satMod val="200000"/>
-              </a:schemeClr>
-            </a:gs>
-          </a:gsLst>
-          <a:path path="circle">
-            <a:fillToRect l="50000" t="50000" r="50000" b="50000"/>
-          </a:path>
-        </a:gradFill>
-      </a:bgFillStyleLst>
-    </a:fmtScheme>
-  </a:themeElements>
-</a:theme>
 </file>
</xml_diff>